<commit_message>
Added a proof for Min-F, and organized the Max-F proof.
</commit_message>
<xml_diff>
--- a/Figures.pptx
+++ b/Figures.pptx
@@ -6,8 +6,9 @@
   </p:sldMasterIdLst>
   <p:sldIdLst>
     <p:sldId id="256" r:id="rId2"/>
-    <p:sldId id="257" r:id="rId3"/>
-    <p:sldId id="258" r:id="rId4"/>
+    <p:sldId id="259" r:id="rId3"/>
+    <p:sldId id="257" r:id="rId4"/>
+    <p:sldId id="258" r:id="rId5"/>
   </p:sldIdLst>
   <p:sldSz cx="12192000" cy="6858000"/>
   <p:notesSz cx="6858000" cy="9144000"/>
@@ -4172,6 +4173,1212 @@
           <a:chExt cx="0" cy="0"/>
         </a:xfrm>
       </p:grpSpPr>
+      <p:sp>
+        <p:nvSpPr>
+          <p:cNvPr id="4" name="Oval 3"/>
+          <p:cNvSpPr/>
+          <p:nvPr/>
+        </p:nvSpPr>
+        <p:spPr>
+          <a:xfrm>
+            <a:off x="6581954" y="629728"/>
+            <a:ext cx="422695" cy="422695"/>
+          </a:xfrm>
+          <a:prstGeom prst="ellipse">
+            <a:avLst/>
+          </a:prstGeom>
+          <a:ln w="28575"/>
+        </p:spPr>
+        <p:style>
+          <a:lnRef idx="2">
+            <a:schemeClr val="dk1"/>
+          </a:lnRef>
+          <a:fillRef idx="1">
+            <a:schemeClr val="lt1"/>
+          </a:fillRef>
+          <a:effectRef idx="0">
+            <a:schemeClr val="dk1"/>
+          </a:effectRef>
+          <a:fontRef idx="minor">
+            <a:schemeClr val="dk1"/>
+          </a:fontRef>
+        </p:style>
+        <p:txBody>
+          <a:bodyPr rtlCol="1" anchor="ctr"/>
+          <a:lstStyle/>
+          <a:p>
+            <a:pPr algn="ctr"/>
+            <a:r>
+              <a:rPr lang="en-US" dirty="0" smtClean="0"/>
+              <a:t>S</a:t>
+            </a:r>
+            <a:endParaRPr lang="he-IL" dirty="0"/>
+          </a:p>
+        </p:txBody>
+      </p:sp>
+      <p:sp>
+        <p:nvSpPr>
+          <p:cNvPr id="5" name="Oval 4"/>
+          <p:cNvSpPr/>
+          <p:nvPr/>
+        </p:nvSpPr>
+        <p:spPr>
+          <a:xfrm>
+            <a:off x="5949350" y="1584384"/>
+            <a:ext cx="422695" cy="422695"/>
+          </a:xfrm>
+          <a:prstGeom prst="ellipse">
+            <a:avLst/>
+          </a:prstGeom>
+          <a:ln w="28575"/>
+        </p:spPr>
+        <p:style>
+          <a:lnRef idx="2">
+            <a:schemeClr val="dk1"/>
+          </a:lnRef>
+          <a:fillRef idx="1">
+            <a:schemeClr val="lt1"/>
+          </a:fillRef>
+          <a:effectRef idx="0">
+            <a:schemeClr val="dk1"/>
+          </a:effectRef>
+          <a:fontRef idx="minor">
+            <a:schemeClr val="dk1"/>
+          </a:fontRef>
+        </p:style>
+        <p:txBody>
+          <a:bodyPr rtlCol="1" anchor="ctr"/>
+          <a:lstStyle/>
+          <a:p>
+            <a:pPr algn="ctr"/>
+            <a:r>
+              <a:rPr lang="en-US" dirty="0" smtClean="0"/>
+              <a:t>A</a:t>
+            </a:r>
+            <a:endParaRPr lang="he-IL" dirty="0"/>
+          </a:p>
+        </p:txBody>
+      </p:sp>
+      <p:sp>
+        <p:nvSpPr>
+          <p:cNvPr id="6" name="Oval 5"/>
+          <p:cNvSpPr/>
+          <p:nvPr/>
+        </p:nvSpPr>
+        <p:spPr>
+          <a:xfrm>
+            <a:off x="7214558" y="1584383"/>
+            <a:ext cx="422695" cy="422695"/>
+          </a:xfrm>
+          <a:prstGeom prst="ellipse">
+            <a:avLst/>
+          </a:prstGeom>
+          <a:ln w="28575"/>
+        </p:spPr>
+        <p:style>
+          <a:lnRef idx="2">
+            <a:schemeClr val="dk1"/>
+          </a:lnRef>
+          <a:fillRef idx="1">
+            <a:schemeClr val="lt1"/>
+          </a:fillRef>
+          <a:effectRef idx="0">
+            <a:schemeClr val="dk1"/>
+          </a:effectRef>
+          <a:fontRef idx="minor">
+            <a:schemeClr val="dk1"/>
+          </a:fontRef>
+        </p:style>
+        <p:txBody>
+          <a:bodyPr rtlCol="1" anchor="ctr"/>
+          <a:lstStyle/>
+          <a:p>
+            <a:pPr algn="ctr"/>
+            <a:r>
+              <a:rPr lang="en-US" dirty="0" smtClean="0"/>
+              <a:t>B</a:t>
+            </a:r>
+            <a:endParaRPr lang="he-IL" dirty="0"/>
+          </a:p>
+        </p:txBody>
+      </p:sp>
+      <p:sp>
+        <p:nvSpPr>
+          <p:cNvPr id="7" name="Oval 6"/>
+          <p:cNvSpPr/>
+          <p:nvPr/>
+        </p:nvSpPr>
+        <p:spPr>
+          <a:xfrm>
+            <a:off x="5924907" y="2763327"/>
+            <a:ext cx="422695" cy="422695"/>
+          </a:xfrm>
+          <a:prstGeom prst="ellipse">
+            <a:avLst/>
+          </a:prstGeom>
+          <a:ln w="28575"/>
+        </p:spPr>
+        <p:style>
+          <a:lnRef idx="2">
+            <a:schemeClr val="dk1"/>
+          </a:lnRef>
+          <a:fillRef idx="1">
+            <a:schemeClr val="lt1"/>
+          </a:fillRef>
+          <a:effectRef idx="0">
+            <a:schemeClr val="dk1"/>
+          </a:effectRef>
+          <a:fontRef idx="minor">
+            <a:schemeClr val="dk1"/>
+          </a:fontRef>
+        </p:style>
+        <p:txBody>
+          <a:bodyPr wrap="none" rtlCol="1" anchor="ctr"/>
+          <a:lstStyle/>
+          <a:p>
+            <a:pPr algn="ctr"/>
+            <a:r>
+              <a:rPr lang="en-US" dirty="0" smtClean="0"/>
+              <a:t>G</a:t>
+            </a:r>
+            <a:r>
+              <a:rPr lang="en-US" baseline="-25000" dirty="0" smtClean="0"/>
+              <a:t>1</a:t>
+            </a:r>
+            <a:endParaRPr lang="he-IL" baseline="-25000" dirty="0"/>
+          </a:p>
+        </p:txBody>
+      </p:sp>
+      <p:sp>
+        <p:nvSpPr>
+          <p:cNvPr id="8" name="Oval 7"/>
+          <p:cNvSpPr/>
+          <p:nvPr/>
+        </p:nvSpPr>
+        <p:spPr>
+          <a:xfrm>
+            <a:off x="7214558" y="2763327"/>
+            <a:ext cx="422695" cy="422695"/>
+          </a:xfrm>
+          <a:prstGeom prst="ellipse">
+            <a:avLst/>
+          </a:prstGeom>
+          <a:ln w="28575"/>
+        </p:spPr>
+        <p:style>
+          <a:lnRef idx="2">
+            <a:schemeClr val="dk1"/>
+          </a:lnRef>
+          <a:fillRef idx="1">
+            <a:schemeClr val="lt1"/>
+          </a:fillRef>
+          <a:effectRef idx="0">
+            <a:schemeClr val="dk1"/>
+          </a:effectRef>
+          <a:fontRef idx="minor">
+            <a:schemeClr val="dk1"/>
+          </a:fontRef>
+        </p:style>
+        <p:txBody>
+          <a:bodyPr wrap="none" rtlCol="1" anchor="ctr"/>
+          <a:lstStyle/>
+          <a:p>
+            <a:pPr algn="ctr"/>
+            <a:r>
+              <a:rPr lang="en-US" dirty="0" smtClean="0"/>
+              <a:t>G</a:t>
+            </a:r>
+            <a:r>
+              <a:rPr lang="en-US" baseline="-25000" dirty="0" smtClean="0"/>
+              <a:t>2</a:t>
+            </a:r>
+            <a:endParaRPr lang="he-IL" baseline="-25000" dirty="0"/>
+          </a:p>
+        </p:txBody>
+      </p:sp>
+      <p:cxnSp>
+        <p:nvCxnSpPr>
+          <p:cNvPr id="10" name="Straight Connector 9"/>
+          <p:cNvCxnSpPr>
+            <a:stCxn id="4" idx="3"/>
+            <a:endCxn id="5" idx="0"/>
+          </p:cNvCxnSpPr>
+          <p:nvPr/>
+        </p:nvCxnSpPr>
+        <p:spPr>
+          <a:xfrm flipH="1">
+            <a:off x="6160698" y="990521"/>
+            <a:ext cx="483158" cy="593863"/>
+          </a:xfrm>
+          <a:prstGeom prst="line">
+            <a:avLst/>
+          </a:prstGeom>
+        </p:spPr>
+        <p:style>
+          <a:lnRef idx="3">
+            <a:schemeClr val="dk1"/>
+          </a:lnRef>
+          <a:fillRef idx="0">
+            <a:schemeClr val="dk1"/>
+          </a:fillRef>
+          <a:effectRef idx="2">
+            <a:schemeClr val="dk1"/>
+          </a:effectRef>
+          <a:fontRef idx="minor">
+            <a:schemeClr val="tx1"/>
+          </a:fontRef>
+        </p:style>
+      </p:cxnSp>
+      <p:cxnSp>
+        <p:nvCxnSpPr>
+          <p:cNvPr id="11" name="Straight Connector 10"/>
+          <p:cNvCxnSpPr>
+            <a:stCxn id="4" idx="5"/>
+            <a:endCxn id="6" idx="0"/>
+          </p:cNvCxnSpPr>
+          <p:nvPr/>
+        </p:nvCxnSpPr>
+        <p:spPr>
+          <a:xfrm>
+            <a:off x="6942747" y="990521"/>
+            <a:ext cx="483159" cy="593862"/>
+          </a:xfrm>
+          <a:prstGeom prst="line">
+            <a:avLst/>
+          </a:prstGeom>
+        </p:spPr>
+        <p:style>
+          <a:lnRef idx="3">
+            <a:schemeClr val="dk1"/>
+          </a:lnRef>
+          <a:fillRef idx="0">
+            <a:schemeClr val="dk1"/>
+          </a:fillRef>
+          <a:effectRef idx="2">
+            <a:schemeClr val="dk1"/>
+          </a:effectRef>
+          <a:fontRef idx="minor">
+            <a:schemeClr val="tx1"/>
+          </a:fontRef>
+        </p:style>
+      </p:cxnSp>
+      <p:cxnSp>
+        <p:nvCxnSpPr>
+          <p:cNvPr id="14" name="Straight Connector 13"/>
+          <p:cNvCxnSpPr>
+            <a:stCxn id="6" idx="4"/>
+            <a:endCxn id="8" idx="0"/>
+          </p:cNvCxnSpPr>
+          <p:nvPr/>
+        </p:nvCxnSpPr>
+        <p:spPr>
+          <a:xfrm>
+            <a:off x="7425906" y="2007078"/>
+            <a:ext cx="0" cy="756249"/>
+          </a:xfrm>
+          <a:prstGeom prst="line">
+            <a:avLst/>
+          </a:prstGeom>
+        </p:spPr>
+        <p:style>
+          <a:lnRef idx="3">
+            <a:schemeClr val="dk1"/>
+          </a:lnRef>
+          <a:fillRef idx="0">
+            <a:schemeClr val="dk1"/>
+          </a:fillRef>
+          <a:effectRef idx="2">
+            <a:schemeClr val="dk1"/>
+          </a:effectRef>
+          <a:fontRef idx="minor">
+            <a:schemeClr val="tx1"/>
+          </a:fontRef>
+        </p:style>
+      </p:cxnSp>
+      <p:cxnSp>
+        <p:nvCxnSpPr>
+          <p:cNvPr id="17" name="Straight Connector 16"/>
+          <p:cNvCxnSpPr>
+            <a:stCxn id="5" idx="4"/>
+            <a:endCxn id="7" idx="0"/>
+          </p:cNvCxnSpPr>
+          <p:nvPr/>
+        </p:nvCxnSpPr>
+        <p:spPr>
+          <a:xfrm flipH="1">
+            <a:off x="6136255" y="2007079"/>
+            <a:ext cx="24443" cy="756248"/>
+          </a:xfrm>
+          <a:prstGeom prst="line">
+            <a:avLst/>
+          </a:prstGeom>
+        </p:spPr>
+        <p:style>
+          <a:lnRef idx="3">
+            <a:schemeClr val="dk1"/>
+          </a:lnRef>
+          <a:fillRef idx="0">
+            <a:schemeClr val="dk1"/>
+          </a:fillRef>
+          <a:effectRef idx="2">
+            <a:schemeClr val="dk1"/>
+          </a:effectRef>
+          <a:fontRef idx="minor">
+            <a:schemeClr val="tx1"/>
+          </a:fontRef>
+        </p:style>
+      </p:cxnSp>
+      <p:sp>
+        <p:nvSpPr>
+          <p:cNvPr id="20" name="TextBox 19"/>
+          <p:cNvSpPr txBox="1"/>
+          <p:nvPr/>
+        </p:nvSpPr>
+        <p:spPr>
+          <a:xfrm>
+            <a:off x="6136254" y="977023"/>
+            <a:ext cx="277395" cy="400110"/>
+          </a:xfrm>
+          <a:prstGeom prst="rect">
+            <a:avLst/>
+          </a:prstGeom>
+          <a:noFill/>
+        </p:spPr>
+        <p:txBody>
+          <a:bodyPr wrap="square" rtlCol="1">
+            <a:spAutoFit/>
+          </a:bodyPr>
+          <a:lstStyle/>
+          <a:p>
+            <a:r>
+              <a:rPr lang="en-US" sz="2000" dirty="0" smtClean="0"/>
+              <a:t>5</a:t>
+            </a:r>
+            <a:endParaRPr lang="he-IL" sz="2000" dirty="0"/>
+          </a:p>
+        </p:txBody>
+      </p:sp>
+      <p:sp>
+        <p:nvSpPr>
+          <p:cNvPr id="21" name="TextBox 20"/>
+          <p:cNvSpPr txBox="1"/>
+          <p:nvPr/>
+        </p:nvSpPr>
+        <p:spPr>
+          <a:xfrm>
+            <a:off x="7302031" y="972926"/>
+            <a:ext cx="694577" cy="400110"/>
+          </a:xfrm>
+          <a:prstGeom prst="rect">
+            <a:avLst/>
+          </a:prstGeom>
+          <a:noFill/>
+        </p:spPr>
+        <p:txBody>
+          <a:bodyPr wrap="square" rtlCol="1">
+            <a:spAutoFit/>
+          </a:bodyPr>
+          <a:lstStyle/>
+          <a:p>
+            <a:r>
+              <a:rPr lang="en-US" sz="2000" dirty="0" smtClean="0"/>
+              <a:t>10</a:t>
+            </a:r>
+            <a:endParaRPr lang="he-IL" sz="2000" dirty="0"/>
+          </a:p>
+        </p:txBody>
+      </p:sp>
+      <p:sp>
+        <p:nvSpPr>
+          <p:cNvPr id="22" name="TextBox 21"/>
+          <p:cNvSpPr txBox="1"/>
+          <p:nvPr/>
+        </p:nvSpPr>
+        <p:spPr>
+          <a:xfrm>
+            <a:off x="7724797" y="1584383"/>
+            <a:ext cx="990760" cy="1015663"/>
+          </a:xfrm>
+          <a:prstGeom prst="rect">
+            <a:avLst/>
+          </a:prstGeom>
+          <a:noFill/>
+        </p:spPr>
+        <p:txBody>
+          <a:bodyPr wrap="square" rtlCol="1">
+            <a:spAutoFit/>
+          </a:bodyPr>
+          <a:lstStyle/>
+          <a:p>
+            <a:r>
+              <a:rPr lang="en-US" sz="2000" dirty="0" smtClean="0"/>
+              <a:t>h</a:t>
+            </a:r>
+            <a:r>
+              <a:rPr lang="en-US" sz="2000" baseline="-25000" dirty="0" smtClean="0"/>
+              <a:t>1</a:t>
+            </a:r>
+            <a:r>
+              <a:rPr lang="en-US" sz="2000" dirty="0" smtClean="0"/>
+              <a:t>=10</a:t>
+            </a:r>
+          </a:p>
+          <a:p>
+            <a:r>
+              <a:rPr lang="en-US" sz="2000" dirty="0" smtClean="0"/>
+              <a:t>h</a:t>
+            </a:r>
+            <a:r>
+              <a:rPr lang="en-US" sz="2000" baseline="-25000" dirty="0" smtClean="0"/>
+              <a:t>2</a:t>
+            </a:r>
+            <a:r>
+              <a:rPr lang="en-US" sz="2000" dirty="0" smtClean="0"/>
+              <a:t>=30</a:t>
+            </a:r>
+            <a:endParaRPr lang="he-IL" sz="2000" dirty="0" smtClean="0"/>
+          </a:p>
+          <a:p>
+            <a:endParaRPr lang="he-IL" sz="2000" dirty="0"/>
+          </a:p>
+        </p:txBody>
+      </p:sp>
+      <p:sp>
+        <p:nvSpPr>
+          <p:cNvPr id="23" name="TextBox 22"/>
+          <p:cNvSpPr txBox="1"/>
+          <p:nvPr/>
+        </p:nvSpPr>
+        <p:spPr>
+          <a:xfrm>
+            <a:off x="5169937" y="1625549"/>
+            <a:ext cx="990760" cy="707886"/>
+          </a:xfrm>
+          <a:prstGeom prst="rect">
+            <a:avLst/>
+          </a:prstGeom>
+          <a:noFill/>
+        </p:spPr>
+        <p:txBody>
+          <a:bodyPr wrap="square" rtlCol="1">
+            <a:spAutoFit/>
+          </a:bodyPr>
+          <a:lstStyle/>
+          <a:p>
+            <a:r>
+              <a:rPr lang="en-US" sz="2000" dirty="0" smtClean="0"/>
+              <a:t>h</a:t>
+            </a:r>
+            <a:r>
+              <a:rPr lang="en-US" sz="2000" baseline="-25000" dirty="0" smtClean="0"/>
+              <a:t>1</a:t>
+            </a:r>
+            <a:r>
+              <a:rPr lang="en-US" sz="2000" dirty="0" smtClean="0"/>
+              <a:t>=5</a:t>
+            </a:r>
+          </a:p>
+          <a:p>
+            <a:r>
+              <a:rPr lang="en-US" sz="2000" dirty="0" smtClean="0"/>
+              <a:t>h</a:t>
+            </a:r>
+            <a:r>
+              <a:rPr lang="en-US" sz="2000" baseline="-25000" dirty="0" smtClean="0"/>
+              <a:t>2</a:t>
+            </a:r>
+            <a:r>
+              <a:rPr lang="en-US" sz="2000" dirty="0" smtClean="0"/>
+              <a:t>=50</a:t>
+            </a:r>
+            <a:endParaRPr lang="he-IL" sz="2000" dirty="0"/>
+          </a:p>
+        </p:txBody>
+      </p:sp>
+      <p:cxnSp>
+        <p:nvCxnSpPr>
+          <p:cNvPr id="24" name="Straight Connector 23"/>
+          <p:cNvCxnSpPr>
+            <a:stCxn id="5" idx="5"/>
+            <a:endCxn id="8" idx="1"/>
+          </p:cNvCxnSpPr>
+          <p:nvPr/>
+        </p:nvCxnSpPr>
+        <p:spPr>
+          <a:xfrm>
+            <a:off x="6310143" y="1945177"/>
+            <a:ext cx="966317" cy="880052"/>
+          </a:xfrm>
+          <a:prstGeom prst="line">
+            <a:avLst/>
+          </a:prstGeom>
+        </p:spPr>
+        <p:style>
+          <a:lnRef idx="3">
+            <a:schemeClr val="dk1"/>
+          </a:lnRef>
+          <a:fillRef idx="0">
+            <a:schemeClr val="dk1"/>
+          </a:fillRef>
+          <a:effectRef idx="2">
+            <a:schemeClr val="dk1"/>
+          </a:effectRef>
+          <a:fontRef idx="minor">
+            <a:schemeClr val="tx1"/>
+          </a:fontRef>
+        </p:style>
+      </p:cxnSp>
+      <p:cxnSp>
+        <p:nvCxnSpPr>
+          <p:cNvPr id="27" name="Straight Connector 26"/>
+          <p:cNvCxnSpPr>
+            <a:stCxn id="6" idx="3"/>
+            <a:endCxn id="7" idx="7"/>
+          </p:cNvCxnSpPr>
+          <p:nvPr/>
+        </p:nvCxnSpPr>
+        <p:spPr>
+          <a:xfrm flipH="1">
+            <a:off x="6285700" y="1945176"/>
+            <a:ext cx="990760" cy="880053"/>
+          </a:xfrm>
+          <a:prstGeom prst="line">
+            <a:avLst/>
+          </a:prstGeom>
+        </p:spPr>
+        <p:style>
+          <a:lnRef idx="3">
+            <a:schemeClr val="dk1"/>
+          </a:lnRef>
+          <a:fillRef idx="0">
+            <a:schemeClr val="dk1"/>
+          </a:fillRef>
+          <a:effectRef idx="2">
+            <a:schemeClr val="dk1"/>
+          </a:effectRef>
+          <a:fontRef idx="minor">
+            <a:schemeClr val="tx1"/>
+          </a:fontRef>
+        </p:style>
+      </p:cxnSp>
+      <p:sp>
+        <p:nvSpPr>
+          <p:cNvPr id="30" name="TextBox 29"/>
+          <p:cNvSpPr txBox="1"/>
+          <p:nvPr/>
+        </p:nvSpPr>
+        <p:spPr>
+          <a:xfrm>
+            <a:off x="6342634" y="1702141"/>
+            <a:ext cx="445082" cy="400110"/>
+          </a:xfrm>
+          <a:prstGeom prst="rect">
+            <a:avLst/>
+          </a:prstGeom>
+          <a:noFill/>
+        </p:spPr>
+        <p:txBody>
+          <a:bodyPr wrap="square" rtlCol="1">
+            <a:spAutoFit/>
+          </a:bodyPr>
+          <a:lstStyle/>
+          <a:p>
+            <a:r>
+              <a:rPr lang="en-US" sz="2000" dirty="0" smtClean="0"/>
+              <a:t>50</a:t>
+            </a:r>
+            <a:endParaRPr lang="he-IL" sz="2000" dirty="0"/>
+          </a:p>
+        </p:txBody>
+      </p:sp>
+      <p:sp>
+        <p:nvSpPr>
+          <p:cNvPr id="31" name="TextBox 30"/>
+          <p:cNvSpPr txBox="1"/>
+          <p:nvPr/>
+        </p:nvSpPr>
+        <p:spPr>
+          <a:xfrm>
+            <a:off x="6824974" y="1702141"/>
+            <a:ext cx="570701" cy="400110"/>
+          </a:xfrm>
+          <a:prstGeom prst="rect">
+            <a:avLst/>
+          </a:prstGeom>
+          <a:noFill/>
+        </p:spPr>
+        <p:txBody>
+          <a:bodyPr wrap="square" rtlCol="1">
+            <a:spAutoFit/>
+          </a:bodyPr>
+          <a:lstStyle/>
+          <a:p>
+            <a:r>
+              <a:rPr lang="en-US" sz="2000" dirty="0" smtClean="0"/>
+              <a:t>10</a:t>
+            </a:r>
+            <a:endParaRPr lang="he-IL" sz="2000" dirty="0"/>
+          </a:p>
+        </p:txBody>
+      </p:sp>
+      <p:sp>
+        <p:nvSpPr>
+          <p:cNvPr id="32" name="TextBox 31"/>
+          <p:cNvSpPr txBox="1"/>
+          <p:nvPr/>
+        </p:nvSpPr>
+        <p:spPr>
+          <a:xfrm>
+            <a:off x="7027653" y="2178245"/>
+            <a:ext cx="547697" cy="400110"/>
+          </a:xfrm>
+          <a:prstGeom prst="rect">
+            <a:avLst/>
+          </a:prstGeom>
+          <a:noFill/>
+        </p:spPr>
+        <p:txBody>
+          <a:bodyPr wrap="square" rtlCol="1">
+            <a:spAutoFit/>
+          </a:bodyPr>
+          <a:lstStyle/>
+          <a:p>
+            <a:r>
+              <a:rPr lang="en-US" sz="2000" dirty="0" smtClean="0"/>
+              <a:t>50</a:t>
+            </a:r>
+            <a:endParaRPr lang="he-IL" sz="2000" dirty="0"/>
+          </a:p>
+        </p:txBody>
+      </p:sp>
+      <p:sp>
+        <p:nvSpPr>
+          <p:cNvPr id="33" name="TextBox 32"/>
+          <p:cNvSpPr txBox="1"/>
+          <p:nvPr/>
+        </p:nvSpPr>
+        <p:spPr>
+          <a:xfrm>
+            <a:off x="6137394" y="2167816"/>
+            <a:ext cx="277395" cy="400110"/>
+          </a:xfrm>
+          <a:prstGeom prst="rect">
+            <a:avLst/>
+          </a:prstGeom>
+          <a:noFill/>
+        </p:spPr>
+        <p:txBody>
+          <a:bodyPr wrap="square" rtlCol="1">
+            <a:spAutoFit/>
+          </a:bodyPr>
+          <a:lstStyle/>
+          <a:p>
+            <a:r>
+              <a:rPr lang="en-US" sz="2000" dirty="0" smtClean="0"/>
+              <a:t>5</a:t>
+            </a:r>
+            <a:endParaRPr lang="he-IL" sz="2000" dirty="0"/>
+          </a:p>
+        </p:txBody>
+      </p:sp>
+      <p:sp>
+        <p:nvSpPr>
+          <p:cNvPr id="34" name="TextBox 33"/>
+          <p:cNvSpPr txBox="1"/>
+          <p:nvPr/>
+        </p:nvSpPr>
+        <p:spPr>
+          <a:xfrm>
+            <a:off x="7083771" y="86970"/>
+            <a:ext cx="1930920" cy="707886"/>
+          </a:xfrm>
+          <a:prstGeom prst="rect">
+            <a:avLst/>
+          </a:prstGeom>
+          <a:noFill/>
+        </p:spPr>
+        <p:txBody>
+          <a:bodyPr wrap="square" rtlCol="1">
+            <a:spAutoFit/>
+          </a:bodyPr>
+          <a:lstStyle/>
+          <a:p>
+            <a:r>
+              <a:rPr lang="en-US" sz="2000" dirty="0" smtClean="0"/>
+              <a:t>h</a:t>
+            </a:r>
+            <a:r>
+              <a:rPr lang="en-US" sz="2000" baseline="-25000" dirty="0" smtClean="0"/>
+              <a:t>1</a:t>
+            </a:r>
+            <a:r>
+              <a:rPr lang="en-US" sz="2000" dirty="0" smtClean="0"/>
+              <a:t>=10</a:t>
+            </a:r>
+          </a:p>
+          <a:p>
+            <a:r>
+              <a:rPr lang="en-US" sz="2000" dirty="0" smtClean="0"/>
+              <a:t>h</a:t>
+            </a:r>
+            <a:r>
+              <a:rPr lang="en-US" sz="2000" baseline="-25000" dirty="0" smtClean="0"/>
+              <a:t>2</a:t>
+            </a:r>
+            <a:r>
+              <a:rPr lang="en-US" sz="2000" dirty="0" smtClean="0"/>
+              <a:t>=40</a:t>
+            </a:r>
+            <a:endParaRPr lang="he-IL" sz="2000" dirty="0"/>
+          </a:p>
+        </p:txBody>
+      </p:sp>
+      <p:sp>
+        <p:nvSpPr>
+          <p:cNvPr id="35" name="TextBox 34"/>
+          <p:cNvSpPr txBox="1"/>
+          <p:nvPr/>
+        </p:nvSpPr>
+        <p:spPr>
+          <a:xfrm>
+            <a:off x="7996608" y="209237"/>
+            <a:ext cx="1930920" cy="400110"/>
+          </a:xfrm>
+          <a:prstGeom prst="rect">
+            <a:avLst/>
+          </a:prstGeom>
+          <a:noFill/>
+        </p:spPr>
+        <p:txBody>
+          <a:bodyPr wrap="square" rtlCol="1">
+            <a:spAutoFit/>
+          </a:bodyPr>
+          <a:lstStyle/>
+          <a:p>
+            <a:r>
+              <a:rPr lang="en-US" sz="2000" dirty="0" err="1" smtClean="0"/>
+              <a:t>F</a:t>
+            </a:r>
+            <a:r>
+              <a:rPr lang="en-US" sz="2000" baseline="-25000" dirty="0" err="1" smtClean="0"/>
+              <a:t>max</a:t>
+            </a:r>
+            <a:r>
+              <a:rPr lang="en-US" sz="2000" dirty="0" smtClean="0"/>
+              <a:t>(S)=40</a:t>
+            </a:r>
+            <a:endParaRPr lang="he-IL" sz="2000" dirty="0"/>
+          </a:p>
+        </p:txBody>
+      </p:sp>
+      <p:sp>
+        <p:nvSpPr>
+          <p:cNvPr id="36" name="TextBox 35"/>
+          <p:cNvSpPr txBox="1"/>
+          <p:nvPr/>
+        </p:nvSpPr>
+        <p:spPr>
+          <a:xfrm>
+            <a:off x="8620062" y="1702141"/>
+            <a:ext cx="1930920" cy="400110"/>
+          </a:xfrm>
+          <a:prstGeom prst="rect">
+            <a:avLst/>
+          </a:prstGeom>
+          <a:noFill/>
+        </p:spPr>
+        <p:txBody>
+          <a:bodyPr wrap="square" rtlCol="1">
+            <a:spAutoFit/>
+          </a:bodyPr>
+          <a:lstStyle/>
+          <a:p>
+            <a:r>
+              <a:rPr lang="en-US" sz="2000" dirty="0" err="1" smtClean="0"/>
+              <a:t>F</a:t>
+            </a:r>
+            <a:r>
+              <a:rPr lang="en-US" sz="2000" baseline="-25000" dirty="0" err="1" smtClean="0"/>
+              <a:t>max</a:t>
+            </a:r>
+            <a:r>
+              <a:rPr lang="en-US" sz="2000" dirty="0" smtClean="0"/>
+              <a:t>(B)=40</a:t>
+            </a:r>
+            <a:endParaRPr lang="he-IL" sz="2000" dirty="0"/>
+          </a:p>
+        </p:txBody>
+      </p:sp>
+      <p:sp>
+        <p:nvSpPr>
+          <p:cNvPr id="37" name="TextBox 36"/>
+          <p:cNvSpPr txBox="1"/>
+          <p:nvPr/>
+        </p:nvSpPr>
+        <p:spPr>
+          <a:xfrm>
+            <a:off x="3709100" y="1595675"/>
+            <a:ext cx="1930920" cy="400110"/>
+          </a:xfrm>
+          <a:prstGeom prst="rect">
+            <a:avLst/>
+          </a:prstGeom>
+          <a:noFill/>
+        </p:spPr>
+        <p:txBody>
+          <a:bodyPr wrap="square" rtlCol="1">
+            <a:spAutoFit/>
+          </a:bodyPr>
+          <a:lstStyle/>
+          <a:p>
+            <a:r>
+              <a:rPr lang="en-US" sz="2000" dirty="0" err="1" smtClean="0"/>
+              <a:t>F</a:t>
+            </a:r>
+            <a:r>
+              <a:rPr lang="en-US" sz="2000" baseline="-25000" dirty="0" err="1" smtClean="0"/>
+              <a:t>max</a:t>
+            </a:r>
+            <a:r>
+              <a:rPr lang="en-US" sz="2000" dirty="0" smtClean="0"/>
+              <a:t>(A)=55</a:t>
+            </a:r>
+            <a:endParaRPr lang="he-IL" sz="2000" dirty="0"/>
+          </a:p>
+        </p:txBody>
+      </p:sp>
+      <p:sp>
+        <p:nvSpPr>
+          <p:cNvPr id="38" name="TextBox 37"/>
+          <p:cNvSpPr txBox="1"/>
+          <p:nvPr/>
+        </p:nvSpPr>
+        <p:spPr>
+          <a:xfrm>
+            <a:off x="3709100" y="2805658"/>
+            <a:ext cx="1930920" cy="400110"/>
+          </a:xfrm>
+          <a:prstGeom prst="rect">
+            <a:avLst/>
+          </a:prstGeom>
+          <a:noFill/>
+        </p:spPr>
+        <p:txBody>
+          <a:bodyPr wrap="square" rtlCol="1">
+            <a:spAutoFit/>
+          </a:bodyPr>
+          <a:lstStyle/>
+          <a:p>
+            <a:r>
+              <a:rPr lang="en-US" sz="2000" dirty="0" err="1" smtClean="0"/>
+              <a:t>F</a:t>
+            </a:r>
+            <a:r>
+              <a:rPr lang="en-US" sz="2000" baseline="-25000" dirty="0" err="1" smtClean="0"/>
+              <a:t>max</a:t>
+            </a:r>
+            <a:r>
+              <a:rPr lang="en-US" sz="2000" dirty="0" smtClean="0"/>
+              <a:t>(G</a:t>
+            </a:r>
+            <a:r>
+              <a:rPr lang="en-US" sz="2000" baseline="-25000" dirty="0" smtClean="0"/>
+              <a:t>1</a:t>
+            </a:r>
+            <a:r>
+              <a:rPr lang="en-US" sz="2000" dirty="0" smtClean="0"/>
+              <a:t>)=40</a:t>
+            </a:r>
+            <a:endParaRPr lang="he-IL" sz="2000" dirty="0"/>
+          </a:p>
+        </p:txBody>
+      </p:sp>
+      <p:sp>
+        <p:nvSpPr>
+          <p:cNvPr id="39" name="TextBox 38"/>
+          <p:cNvSpPr txBox="1"/>
+          <p:nvPr/>
+        </p:nvSpPr>
+        <p:spPr>
+          <a:xfrm>
+            <a:off x="8624172" y="2763327"/>
+            <a:ext cx="1930920" cy="400110"/>
+          </a:xfrm>
+          <a:prstGeom prst="rect">
+            <a:avLst/>
+          </a:prstGeom>
+          <a:noFill/>
+        </p:spPr>
+        <p:txBody>
+          <a:bodyPr wrap="square" rtlCol="1">
+            <a:spAutoFit/>
+          </a:bodyPr>
+          <a:lstStyle/>
+          <a:p>
+            <a:r>
+              <a:rPr lang="en-US" sz="2000" dirty="0" err="1" smtClean="0"/>
+              <a:t>F</a:t>
+            </a:r>
+            <a:r>
+              <a:rPr lang="en-US" sz="2000" baseline="-25000" dirty="0" err="1" smtClean="0"/>
+              <a:t>max</a:t>
+            </a:r>
+            <a:r>
+              <a:rPr lang="en-US" sz="2000" dirty="0" smtClean="0"/>
+              <a:t>(G</a:t>
+            </a:r>
+            <a:r>
+              <a:rPr lang="en-US" sz="2000" baseline="-25000" dirty="0" smtClean="0"/>
+              <a:t>2</a:t>
+            </a:r>
+            <a:r>
+              <a:rPr lang="en-US" sz="2000" dirty="0" smtClean="0"/>
+              <a:t>)=80</a:t>
+            </a:r>
+            <a:endParaRPr lang="he-IL" sz="2000" dirty="0"/>
+          </a:p>
+        </p:txBody>
+      </p:sp>
+      <p:sp>
+        <p:nvSpPr>
+          <p:cNvPr id="40" name="TextBox 39"/>
+          <p:cNvSpPr txBox="1"/>
+          <p:nvPr/>
+        </p:nvSpPr>
+        <p:spPr>
+          <a:xfrm>
+            <a:off x="5144640" y="2693056"/>
+            <a:ext cx="990760" cy="707886"/>
+          </a:xfrm>
+          <a:prstGeom prst="rect">
+            <a:avLst/>
+          </a:prstGeom>
+          <a:noFill/>
+        </p:spPr>
+        <p:txBody>
+          <a:bodyPr wrap="square" rtlCol="1">
+            <a:spAutoFit/>
+          </a:bodyPr>
+          <a:lstStyle/>
+          <a:p>
+            <a:r>
+              <a:rPr lang="en-US" sz="2000" dirty="0" smtClean="0"/>
+              <a:t>h</a:t>
+            </a:r>
+            <a:r>
+              <a:rPr lang="en-US" sz="2000" baseline="-25000" dirty="0" smtClean="0"/>
+              <a:t>1</a:t>
+            </a:r>
+            <a:r>
+              <a:rPr lang="en-US" sz="2000" dirty="0" smtClean="0"/>
+              <a:t>=0</a:t>
+            </a:r>
+          </a:p>
+          <a:p>
+            <a:r>
+              <a:rPr lang="en-US" sz="2000" dirty="0" smtClean="0"/>
+              <a:t>h</a:t>
+            </a:r>
+            <a:r>
+              <a:rPr lang="en-US" sz="2000" baseline="-25000" dirty="0" smtClean="0"/>
+              <a:t>2</a:t>
+            </a:r>
+            <a:r>
+              <a:rPr lang="en-US" sz="2000" dirty="0" smtClean="0"/>
+              <a:t>=20</a:t>
+            </a:r>
+            <a:endParaRPr lang="he-IL" sz="2000" dirty="0"/>
+          </a:p>
+        </p:txBody>
+      </p:sp>
+      <p:sp>
+        <p:nvSpPr>
+          <p:cNvPr id="41" name="TextBox 40"/>
+          <p:cNvSpPr txBox="1"/>
+          <p:nvPr/>
+        </p:nvSpPr>
+        <p:spPr>
+          <a:xfrm>
+            <a:off x="7786699" y="2611078"/>
+            <a:ext cx="990760" cy="707886"/>
+          </a:xfrm>
+          <a:prstGeom prst="rect">
+            <a:avLst/>
+          </a:prstGeom>
+          <a:noFill/>
+        </p:spPr>
+        <p:txBody>
+          <a:bodyPr wrap="square" rtlCol="1">
+            <a:spAutoFit/>
+          </a:bodyPr>
+          <a:lstStyle/>
+          <a:p>
+            <a:r>
+              <a:rPr lang="en-US" sz="2000" dirty="0" smtClean="0"/>
+              <a:t>h</a:t>
+            </a:r>
+            <a:r>
+              <a:rPr lang="en-US" sz="2000" baseline="-25000" dirty="0" smtClean="0"/>
+              <a:t>1</a:t>
+            </a:r>
+            <a:r>
+              <a:rPr lang="en-US" sz="2000" dirty="0" smtClean="0"/>
+              <a:t>=20</a:t>
+            </a:r>
+          </a:p>
+          <a:p>
+            <a:r>
+              <a:rPr lang="en-US" sz="2000" dirty="0" smtClean="0"/>
+              <a:t>h</a:t>
+            </a:r>
+            <a:r>
+              <a:rPr lang="en-US" sz="2000" baseline="-25000" dirty="0" smtClean="0"/>
+              <a:t>2</a:t>
+            </a:r>
+            <a:r>
+              <a:rPr lang="en-US" sz="2000" dirty="0" smtClean="0"/>
+              <a:t>=0</a:t>
+            </a:r>
+            <a:endParaRPr lang="he-IL" sz="2000" dirty="0"/>
+          </a:p>
+        </p:txBody>
+      </p:sp>
+      <p:sp>
+        <p:nvSpPr>
+          <p:cNvPr id="42" name="Rounded Rectangular Callout 41"/>
+          <p:cNvSpPr/>
+          <p:nvPr/>
+        </p:nvSpPr>
+        <p:spPr>
+          <a:xfrm>
+            <a:off x="1049527" y="2763327"/>
+            <a:ext cx="1413163" cy="507870"/>
+          </a:xfrm>
+          <a:prstGeom prst="wedgeRoundRectCallout">
+            <a:avLst>
+              <a:gd name="adj1" fmla="val 98775"/>
+              <a:gd name="adj2" fmla="val 12488"/>
+              <a:gd name="adj3" fmla="val 16667"/>
+            </a:avLst>
+          </a:prstGeom>
+        </p:spPr>
+        <p:style>
+          <a:lnRef idx="2">
+            <a:schemeClr val="accent1">
+              <a:shade val="50000"/>
+            </a:schemeClr>
+          </a:lnRef>
+          <a:fillRef idx="1">
+            <a:schemeClr val="accent1"/>
+          </a:fillRef>
+          <a:effectRef idx="0">
+            <a:schemeClr val="accent1"/>
+          </a:effectRef>
+          <a:fontRef idx="minor">
+            <a:schemeClr val="lt1"/>
+          </a:fontRef>
+        </p:style>
+        <p:txBody>
+          <a:bodyPr rtlCol="1" anchor="ctr"/>
+          <a:lstStyle/>
+          <a:p>
+            <a:pPr algn="ctr"/>
+            <a:r>
+              <a:rPr lang="en-US" dirty="0" smtClean="0"/>
+              <a:t>Inconsistent</a:t>
+            </a:r>
+            <a:endParaRPr lang="he-IL" dirty="0"/>
+          </a:p>
+        </p:txBody>
+      </p:sp>
+      <p:sp>
+        <p:nvSpPr>
+          <p:cNvPr id="43" name="TextBox 42"/>
+          <p:cNvSpPr txBox="1"/>
+          <p:nvPr/>
+        </p:nvSpPr>
+        <p:spPr>
+          <a:xfrm>
+            <a:off x="665018" y="440913"/>
+            <a:ext cx="1797672" cy="1200329"/>
+          </a:xfrm>
+          <a:prstGeom prst="rect">
+            <a:avLst/>
+          </a:prstGeom>
+          <a:noFill/>
+        </p:spPr>
+        <p:txBody>
+          <a:bodyPr wrap="none" rtlCol="1">
+            <a:spAutoFit/>
+          </a:bodyPr>
+          <a:lstStyle/>
+          <a:p>
+            <a:r>
+              <a:rPr lang="en-US" b="1" dirty="0" smtClean="0"/>
+              <a:t>Expansion order:</a:t>
+            </a:r>
+          </a:p>
+          <a:p>
+            <a:pPr algn="ctr"/>
+            <a:r>
+              <a:rPr lang="en-US" dirty="0" smtClean="0"/>
+              <a:t>S(40)</a:t>
+            </a:r>
+          </a:p>
+          <a:p>
+            <a:pPr algn="ctr"/>
+            <a:r>
+              <a:rPr lang="en-US" dirty="0" smtClean="0"/>
+              <a:t>B(40)</a:t>
+            </a:r>
+          </a:p>
+          <a:p>
+            <a:pPr algn="ctr"/>
+            <a:r>
+              <a:rPr lang="en-US" dirty="0" smtClean="0"/>
+              <a:t>G</a:t>
+            </a:r>
+            <a:r>
+              <a:rPr lang="en-US" baseline="-25000" dirty="0" smtClean="0"/>
+              <a:t>1</a:t>
+            </a:r>
+            <a:r>
+              <a:rPr lang="en-US" dirty="0" smtClean="0"/>
+              <a:t>(40)</a:t>
+            </a:r>
+          </a:p>
+        </p:txBody>
+      </p:sp>
+    </p:spTree>
+    <p:extLst>
+      <p:ext uri="{BB962C8B-B14F-4D97-AF65-F5344CB8AC3E}">
+        <p14:creationId xmlns:p14="http://schemas.microsoft.com/office/powerpoint/2010/main" val="1909350835"/>
+      </p:ext>
+    </p:extLst>
+  </p:cSld>
+  <p:clrMapOvr>
+    <a:masterClrMapping/>
+  </p:clrMapOvr>
+</p:sld>
+</file>
+
+<file path=ppt/slides/slide3.xml><?xml version="1.0" encoding="utf-8"?>
+<p:sld xmlns:a="http://schemas.openxmlformats.org/drawingml/2006/main" xmlns:r="http://schemas.openxmlformats.org/officeDocument/2006/relationships" xmlns:p="http://schemas.openxmlformats.org/presentationml/2006/main">
+  <p:cSld>
+    <p:spTree>
+      <p:nvGrpSpPr>
+        <p:cNvPr id="1" name=""/>
+        <p:cNvGrpSpPr/>
+        <p:nvPr/>
+      </p:nvGrpSpPr>
+      <p:grpSpPr>
+        <a:xfrm>
+          <a:off x="0" y="0"/>
+          <a:ext cx="0" cy="0"/>
+          <a:chOff x="0" y="0"/>
+          <a:chExt cx="0" cy="0"/>
+        </a:xfrm>
+      </p:grpSpPr>
     </p:spTree>
     <p:extLst>
       <p:ext uri="{BB962C8B-B14F-4D97-AF65-F5344CB8AC3E}">
@@ -4185,7 +5392,7 @@
 </p:sld>
 </file>
 
-<file path=ppt/slides/slide3.xml><?xml version="1.0" encoding="utf-8"?>
+<file path=ppt/slides/slide4.xml><?xml version="1.0" encoding="utf-8"?>
 <p:sld xmlns:a="http://schemas.openxmlformats.org/drawingml/2006/main" xmlns:r="http://schemas.openxmlformats.org/officeDocument/2006/relationships" xmlns:p="http://schemas.openxmlformats.org/presentationml/2006/main">
   <p:cSld>
     <p:spTree>

</xml_diff>

<commit_message>
Fixed Ariel's last batch of comments.
</commit_message>
<xml_diff>
--- a/Figures.pptx
+++ b/Figures.pptx
@@ -25,6 +25,8 @@
     <p:sldId id="261" r:id="rId19"/>
     <p:sldId id="262" r:id="rId20"/>
     <p:sldId id="274" r:id="rId21"/>
+    <p:sldId id="276" r:id="rId22"/>
+    <p:sldId id="277" r:id="rId23"/>
   </p:sldIdLst>
   <p:sldSz cx="12192000" cy="6858000"/>
   <p:notesSz cx="6858000" cy="9144000"/>
@@ -555,7 +557,6 @@
               </a:p>
             </c:rich>
           </c:tx>
-          <c:layout/>
           <c:overlay val="0"/>
           <c:spPr>
             <a:noFill/>
@@ -678,7 +679,6 @@
               </a:p>
             </c:rich>
           </c:tx>
-          <c:layout/>
           <c:overlay val="0"/>
           <c:spPr>
             <a:noFill/>
@@ -3171,7 +3171,14 @@
           </a:p>
         </c:rich>
       </c:tx>
-      <c:layout/>
+      <c:layout>
+        <c:manualLayout>
+          <c:xMode val="edge"/>
+          <c:yMode val="edge"/>
+          <c:x val="0.33676197940583652"/>
+          <c:y val="6.3788300335982803E-2"/>
+        </c:manualLayout>
+      </c:layout>
       <c:overlay val="0"/>
       <c:spPr>
         <a:noFill/>
@@ -3203,7 +3210,17 @@
     </c:title>
     <c:autoTitleDeleted val="0"/>
     <c:plotArea>
-      <c:layout/>
+      <c:layout>
+        <c:manualLayout>
+          <c:layoutTarget val="inner"/>
+          <c:xMode val="edge"/>
+          <c:yMode val="edge"/>
+          <c:x val="0.18196959024792952"/>
+          <c:y val="0.20183096678491197"/>
+          <c:w val="0.78112351808524516"/>
+          <c:h val="0.56002423464414364"/>
+        </c:manualLayout>
+      </c:layout>
       <c:lineChart>
         <c:grouping val="standard"/>
         <c:varyColors val="0"/>
@@ -3211,7 +3228,7 @@
           <c:idx val="2"/>
           <c:order val="0"/>
           <c:tx>
-            <c:v>Per Goal</c:v>
+            <c:v>k x A*</c:v>
           </c:tx>
           <c:spPr>
             <a:ln w="28575" cap="rnd">
@@ -3300,7 +3317,7 @@
           <c:smooth val="0"/>
           <c:extLst>
             <c:ext xmlns:c16="http://schemas.microsoft.com/office/drawing/2014/chart" uri="{C3380CC4-5D6E-409C-BE32-E72D297353CC}">
-              <c16:uniqueId val="{00000000-17DA-41F5-A5F1-DCC192195DAF}"/>
+              <c16:uniqueId val="{00000000-B41C-4087-8B35-B77FF7525C32}"/>
             </c:ext>
           </c:extLst>
         </c:ser>
@@ -3308,7 +3325,7 @@
           <c:idx val="3"/>
           <c:order val="1"/>
           <c:tx>
-            <c:v>Uniform</c:v>
+            <c:v>UCS</c:v>
           </c:tx>
           <c:spPr>
             <a:ln w="28575" cap="rnd">
@@ -3397,7 +3414,7 @@
           <c:smooth val="0"/>
           <c:extLst>
             <c:ext xmlns:c16="http://schemas.microsoft.com/office/drawing/2014/chart" uri="{C3380CC4-5D6E-409C-BE32-E72D297353CC}">
-              <c16:uniqueId val="{00000001-17DA-41F5-A5F1-DCC192195DAF}"/>
+              <c16:uniqueId val="{00000001-B41C-4087-8B35-B77FF7525C32}"/>
             </c:ext>
           </c:extLst>
         </c:ser>
@@ -3405,7 +3422,7 @@
           <c:idx val="0"/>
           <c:order val="2"/>
           <c:tx>
-            <c:v>Min (Lazy Update)</c:v>
+            <c:v>Lazy kA*min</c:v>
           </c:tx>
           <c:spPr>
             <a:ln w="28575" cap="rnd">
@@ -3418,7 +3435,7 @@
           </c:spPr>
           <c:marker>
             <c:symbol val="square"/>
-            <c:size val="8"/>
+            <c:size val="9"/>
             <c:spPr>
               <a:solidFill>
                 <a:schemeClr val="accent1"/>
@@ -3494,7 +3511,7 @@
           <c:smooth val="0"/>
           <c:extLst>
             <c:ext xmlns:c16="http://schemas.microsoft.com/office/drawing/2014/chart" uri="{C3380CC4-5D6E-409C-BE32-E72D297353CC}">
-              <c16:uniqueId val="{00000002-17DA-41F5-A5F1-DCC192195DAF}"/>
+              <c16:uniqueId val="{00000002-B41C-4087-8B35-B77FF7525C32}"/>
             </c:ext>
           </c:extLst>
         </c:ser>
@@ -3743,6 +3760,49 @@
         <a:effectLst/>
       </c:spPr>
     </c:plotArea>
+    <c:legend>
+      <c:legendPos val="r"/>
+      <c:layout>
+        <c:manualLayout>
+          <c:xMode val="edge"/>
+          <c:yMode val="edge"/>
+          <c:x val="0.24719960886225995"/>
+          <c:y val="0.23013154094667149"/>
+          <c:w val="0.51957493387770315"/>
+          <c:h val="0.2042413097616918"/>
+        </c:manualLayout>
+      </c:layout>
+      <c:overlay val="0"/>
+      <c:spPr>
+        <a:solidFill>
+          <a:schemeClr val="bg1"/>
+        </a:solidFill>
+        <a:ln>
+          <a:noFill/>
+        </a:ln>
+        <a:effectLst/>
+      </c:spPr>
+      <c:txPr>
+        <a:bodyPr rot="0" spcFirstLastPara="1" vertOverflow="ellipsis" vert="horz" wrap="square" anchor="ctr" anchorCtr="1"/>
+        <a:lstStyle/>
+        <a:p>
+          <a:pPr>
+            <a:defRPr sz="1050" b="0" i="0" u="none" strike="noStrike" kern="1200" baseline="0">
+              <a:solidFill>
+                <a:schemeClr val="tx1">
+                  <a:lumMod val="65000"/>
+                  <a:lumOff val="35000"/>
+                </a:schemeClr>
+              </a:solidFill>
+              <a:latin typeface="+mn-lt"/>
+              <a:ea typeface="+mn-ea"/>
+              <a:cs typeface="+mn-cs"/>
+            </a:defRPr>
+          </a:pPr>
+          <a:endParaRPr lang="he-IL"/>
+        </a:p>
+      </c:txPr>
+    </c:legend>
     <c:plotVisOnly val="1"/>
     <c:dispBlanksAs val="gap"/>
     <c:showDLblsOverMax val="0"/>
@@ -3767,7 +3827,1516 @@
   <c:externalData r:id="rId3">
     <c:autoUpdate val="0"/>
   </c:externalData>
-  <c:userShapes r:id="rId4"/>
+</c:chartSpace>
+</file>
+
+<file path=ppt/charts/chart15.xml><?xml version="1.0" encoding="utf-8"?>
+<c:chartSpace xmlns:c="http://schemas.openxmlformats.org/drawingml/2006/chart" xmlns:a="http://schemas.openxmlformats.org/drawingml/2006/main" xmlns:r="http://schemas.openxmlformats.org/officeDocument/2006/relationships" xmlns:c16r2="http://schemas.microsoft.com/office/drawing/2015/06/chart">
+  <c:date1904 val="0"/>
+  <c:lang val="en-US"/>
+  <c:roundedCorners val="0"/>
+  <mc:AlternateContent xmlns:mc="http://schemas.openxmlformats.org/markup-compatibility/2006">
+    <mc:Choice xmlns:c14="http://schemas.microsoft.com/office/drawing/2007/8/2/chart" Requires="c14">
+      <c14:style val="102"/>
+    </mc:Choice>
+    <mc:Fallback>
+      <c:style val="2"/>
+    </mc:Fallback>
+  </mc:AlternateContent>
+  <c:chart>
+    <c:autoTitleDeleted val="1"/>
+    <c:plotArea>
+      <c:layout>
+        <c:manualLayout>
+          <c:layoutTarget val="inner"/>
+          <c:xMode val="edge"/>
+          <c:yMode val="edge"/>
+          <c:x val="0.11106491435406017"/>
+          <c:y val="4.3521266073194856E-2"/>
+          <c:w val="0.82599326982861321"/>
+          <c:h val="0.78333014011230795"/>
+        </c:manualLayout>
+      </c:layout>
+      <c:lineChart>
+        <c:grouping val="standard"/>
+        <c:varyColors val="0"/>
+        <c:ser>
+          <c:idx val="0"/>
+          <c:order val="0"/>
+          <c:tx>
+            <c:v>kA*min</c:v>
+          </c:tx>
+          <c:spPr>
+            <a:ln w="28575" cap="rnd">
+              <a:solidFill>
+                <a:schemeClr val="accent1"/>
+              </a:solidFill>
+              <a:round/>
+            </a:ln>
+            <a:effectLst/>
+          </c:spPr>
+          <c:marker>
+            <c:symbol val="triangle"/>
+            <c:size val="10"/>
+            <c:spPr>
+              <a:solidFill>
+                <a:schemeClr val="accent1"/>
+              </a:solidFill>
+              <a:ln w="9525">
+                <a:solidFill>
+                  <a:schemeClr val="tx1"/>
+                </a:solidFill>
+              </a:ln>
+              <a:effectLst/>
+            </c:spPr>
+          </c:marker>
+          <c:cat>
+            <c:numRef>
+              <c:f>[1]Results!$E$8:$E$17</c:f>
+              <c:numCache>
+                <c:formatCode>General</c:formatCode>
+                <c:ptCount val="10"/>
+                <c:pt idx="0">
+                  <c:v>17</c:v>
+                </c:pt>
+                <c:pt idx="1">
+                  <c:v>40</c:v>
+                </c:pt>
+                <c:pt idx="2">
+                  <c:v>66</c:v>
+                </c:pt>
+                <c:pt idx="3">
+                  <c:v>91</c:v>
+                </c:pt>
+                <c:pt idx="4">
+                  <c:v>116</c:v>
+                </c:pt>
+                <c:pt idx="5">
+                  <c:v>142</c:v>
+                </c:pt>
+                <c:pt idx="6">
+                  <c:v>168</c:v>
+                </c:pt>
+                <c:pt idx="7">
+                  <c:v>192</c:v>
+                </c:pt>
+                <c:pt idx="8">
+                  <c:v>216</c:v>
+                </c:pt>
+                <c:pt idx="9">
+                  <c:v>243</c:v>
+                </c:pt>
+              </c:numCache>
+            </c:numRef>
+          </c:cat>
+          <c:val>
+            <c:numRef>
+              <c:f>[1]Results!$G$8:$G$17</c:f>
+              <c:numCache>
+                <c:formatCode>General</c:formatCode>
+                <c:ptCount val="10"/>
+                <c:pt idx="0">
+                  <c:v>2.72</c:v>
+                </c:pt>
+                <c:pt idx="1">
+                  <c:v>2.92</c:v>
+                </c:pt>
+                <c:pt idx="2">
+                  <c:v>3.28</c:v>
+                </c:pt>
+                <c:pt idx="3">
+                  <c:v>3.55</c:v>
+                </c:pt>
+                <c:pt idx="4">
+                  <c:v>3.88</c:v>
+                </c:pt>
+                <c:pt idx="5">
+                  <c:v>4.54</c:v>
+                </c:pt>
+                <c:pt idx="6">
+                  <c:v>5.13</c:v>
+                </c:pt>
+                <c:pt idx="7">
+                  <c:v>5.99</c:v>
+                </c:pt>
+                <c:pt idx="8">
+                  <c:v>6.46</c:v>
+                </c:pt>
+                <c:pt idx="9">
+                  <c:v>7.65</c:v>
+                </c:pt>
+              </c:numCache>
+            </c:numRef>
+          </c:val>
+          <c:smooth val="0"/>
+          <c:extLst>
+            <c:ext xmlns:c16="http://schemas.microsoft.com/office/drawing/2014/chart" uri="{C3380CC4-5D6E-409C-BE32-E72D297353CC}">
+              <c16:uniqueId val="{00000000-AA29-4ACF-8742-C5CC4CAA95AC}"/>
+            </c:ext>
+          </c:extLst>
+        </c:ser>
+        <c:ser>
+          <c:idx val="1"/>
+          <c:order val="1"/>
+          <c:tx>
+            <c:v>kA*max</c:v>
+          </c:tx>
+          <c:spPr>
+            <a:ln w="28575" cap="rnd">
+              <a:solidFill>
+                <a:schemeClr val="accent2"/>
+              </a:solidFill>
+              <a:round/>
+            </a:ln>
+            <a:effectLst/>
+          </c:spPr>
+          <c:marker>
+            <c:symbol val="square"/>
+            <c:size val="10"/>
+            <c:spPr>
+              <a:solidFill>
+                <a:schemeClr val="accent2"/>
+              </a:solidFill>
+              <a:ln w="9525">
+                <a:solidFill>
+                  <a:schemeClr val="tx1"/>
+                </a:solidFill>
+              </a:ln>
+              <a:effectLst/>
+            </c:spPr>
+          </c:marker>
+          <c:cat>
+            <c:numRef>
+              <c:f>[1]Results!$E$8:$E$17</c:f>
+              <c:numCache>
+                <c:formatCode>General</c:formatCode>
+                <c:ptCount val="10"/>
+                <c:pt idx="0">
+                  <c:v>17</c:v>
+                </c:pt>
+                <c:pt idx="1">
+                  <c:v>40</c:v>
+                </c:pt>
+                <c:pt idx="2">
+                  <c:v>66</c:v>
+                </c:pt>
+                <c:pt idx="3">
+                  <c:v>91</c:v>
+                </c:pt>
+                <c:pt idx="4">
+                  <c:v>116</c:v>
+                </c:pt>
+                <c:pt idx="5">
+                  <c:v>142</c:v>
+                </c:pt>
+                <c:pt idx="6">
+                  <c:v>168</c:v>
+                </c:pt>
+                <c:pt idx="7">
+                  <c:v>192</c:v>
+                </c:pt>
+                <c:pt idx="8">
+                  <c:v>216</c:v>
+                </c:pt>
+                <c:pt idx="9">
+                  <c:v>243</c:v>
+                </c:pt>
+              </c:numCache>
+            </c:numRef>
+          </c:cat>
+          <c:val>
+            <c:numRef>
+              <c:f>[1]Results!$H$8:$H$17</c:f>
+              <c:numCache>
+                <c:formatCode>General</c:formatCode>
+                <c:ptCount val="10"/>
+                <c:pt idx="0">
+                  <c:v>3.38</c:v>
+                </c:pt>
+                <c:pt idx="1">
+                  <c:v>3.81</c:v>
+                </c:pt>
+                <c:pt idx="2">
+                  <c:v>4.29</c:v>
+                </c:pt>
+                <c:pt idx="3">
+                  <c:v>4.62</c:v>
+                </c:pt>
+                <c:pt idx="4">
+                  <c:v>5.16</c:v>
+                </c:pt>
+                <c:pt idx="5">
+                  <c:v>6.08</c:v>
+                </c:pt>
+                <c:pt idx="6">
+                  <c:v>6.57</c:v>
+                </c:pt>
+                <c:pt idx="7">
+                  <c:v>7.73</c:v>
+                </c:pt>
+                <c:pt idx="8">
+                  <c:v>8.52</c:v>
+                </c:pt>
+                <c:pt idx="9">
+                  <c:v>9.19</c:v>
+                </c:pt>
+              </c:numCache>
+            </c:numRef>
+          </c:val>
+          <c:smooth val="0"/>
+          <c:extLst>
+            <c:ext xmlns:c16="http://schemas.microsoft.com/office/drawing/2014/chart" uri="{C3380CC4-5D6E-409C-BE32-E72D297353CC}">
+              <c16:uniqueId val="{00000001-AA29-4ACF-8742-C5CC4CAA95AC}"/>
+            </c:ext>
+          </c:extLst>
+        </c:ser>
+        <c:ser>
+          <c:idx val="2"/>
+          <c:order val="2"/>
+          <c:tx>
+            <c:v>k x A*</c:v>
+          </c:tx>
+          <c:spPr>
+            <a:ln w="28575" cap="rnd">
+              <a:solidFill>
+                <a:schemeClr val="accent3"/>
+              </a:solidFill>
+              <a:round/>
+            </a:ln>
+            <a:effectLst/>
+          </c:spPr>
+          <c:marker>
+            <c:symbol val="diamond"/>
+            <c:size val="10"/>
+            <c:spPr>
+              <a:solidFill>
+                <a:schemeClr val="accent3"/>
+              </a:solidFill>
+              <a:ln w="9525">
+                <a:solidFill>
+                  <a:schemeClr val="tx1"/>
+                </a:solidFill>
+              </a:ln>
+              <a:effectLst/>
+            </c:spPr>
+          </c:marker>
+          <c:cat>
+            <c:numRef>
+              <c:f>[1]Results!$E$8:$E$17</c:f>
+              <c:numCache>
+                <c:formatCode>General</c:formatCode>
+                <c:ptCount val="10"/>
+                <c:pt idx="0">
+                  <c:v>17</c:v>
+                </c:pt>
+                <c:pt idx="1">
+                  <c:v>40</c:v>
+                </c:pt>
+                <c:pt idx="2">
+                  <c:v>66</c:v>
+                </c:pt>
+                <c:pt idx="3">
+                  <c:v>91</c:v>
+                </c:pt>
+                <c:pt idx="4">
+                  <c:v>116</c:v>
+                </c:pt>
+                <c:pt idx="5">
+                  <c:v>142</c:v>
+                </c:pt>
+                <c:pt idx="6">
+                  <c:v>168</c:v>
+                </c:pt>
+                <c:pt idx="7">
+                  <c:v>192</c:v>
+                </c:pt>
+                <c:pt idx="8">
+                  <c:v>216</c:v>
+                </c:pt>
+                <c:pt idx="9">
+                  <c:v>243</c:v>
+                </c:pt>
+              </c:numCache>
+            </c:numRef>
+          </c:cat>
+          <c:val>
+            <c:numRef>
+              <c:f>[1]Results!$I$8:$I$17</c:f>
+              <c:numCache>
+                <c:formatCode>General</c:formatCode>
+                <c:ptCount val="10"/>
+                <c:pt idx="0">
+                  <c:v>4.4400000000000004</c:v>
+                </c:pt>
+                <c:pt idx="1">
+                  <c:v>4.21</c:v>
+                </c:pt>
+                <c:pt idx="2">
+                  <c:v>4.22</c:v>
+                </c:pt>
+                <c:pt idx="3">
+                  <c:v>4.1500000000000004</c:v>
+                </c:pt>
+                <c:pt idx="4">
+                  <c:v>4.24</c:v>
+                </c:pt>
+                <c:pt idx="5">
+                  <c:v>4.84</c:v>
+                </c:pt>
+                <c:pt idx="6">
+                  <c:v>5.47</c:v>
+                </c:pt>
+                <c:pt idx="7">
+                  <c:v>6.21</c:v>
+                </c:pt>
+                <c:pt idx="8">
+                  <c:v>6.76</c:v>
+                </c:pt>
+                <c:pt idx="9">
+                  <c:v>7.73</c:v>
+                </c:pt>
+              </c:numCache>
+            </c:numRef>
+          </c:val>
+          <c:smooth val="0"/>
+          <c:extLst>
+            <c:ext xmlns:c16="http://schemas.microsoft.com/office/drawing/2014/chart" uri="{C3380CC4-5D6E-409C-BE32-E72D297353CC}">
+              <c16:uniqueId val="{00000002-AA29-4ACF-8742-C5CC4CAA95AC}"/>
+            </c:ext>
+          </c:extLst>
+        </c:ser>
+        <c:ser>
+          <c:idx val="3"/>
+          <c:order val="3"/>
+          <c:tx>
+            <c:v>UCS</c:v>
+          </c:tx>
+          <c:spPr>
+            <a:ln w="28575" cap="rnd">
+              <a:solidFill>
+                <a:schemeClr val="accent4"/>
+              </a:solidFill>
+              <a:round/>
+            </a:ln>
+            <a:effectLst/>
+          </c:spPr>
+          <c:marker>
+            <c:symbol val="circle"/>
+            <c:size val="9"/>
+            <c:spPr>
+              <a:solidFill>
+                <a:schemeClr val="accent4"/>
+              </a:solidFill>
+              <a:ln w="9525">
+                <a:solidFill>
+                  <a:schemeClr val="tx1"/>
+                </a:solidFill>
+              </a:ln>
+              <a:effectLst/>
+            </c:spPr>
+          </c:marker>
+          <c:cat>
+            <c:numRef>
+              <c:f>[1]Results!$E$8:$E$17</c:f>
+              <c:numCache>
+                <c:formatCode>General</c:formatCode>
+                <c:ptCount val="10"/>
+                <c:pt idx="0">
+                  <c:v>17</c:v>
+                </c:pt>
+                <c:pt idx="1">
+                  <c:v>40</c:v>
+                </c:pt>
+                <c:pt idx="2">
+                  <c:v>66</c:v>
+                </c:pt>
+                <c:pt idx="3">
+                  <c:v>91</c:v>
+                </c:pt>
+                <c:pt idx="4">
+                  <c:v>116</c:v>
+                </c:pt>
+                <c:pt idx="5">
+                  <c:v>142</c:v>
+                </c:pt>
+                <c:pt idx="6">
+                  <c:v>168</c:v>
+                </c:pt>
+                <c:pt idx="7">
+                  <c:v>192</c:v>
+                </c:pt>
+                <c:pt idx="8">
+                  <c:v>216</c:v>
+                </c:pt>
+                <c:pt idx="9">
+                  <c:v>243</c:v>
+                </c:pt>
+              </c:numCache>
+            </c:numRef>
+          </c:cat>
+          <c:val>
+            <c:numRef>
+              <c:f>[1]Results!$J$8:$J$17</c:f>
+              <c:numCache>
+                <c:formatCode>General</c:formatCode>
+                <c:ptCount val="10"/>
+                <c:pt idx="0">
+                  <c:v>5.36</c:v>
+                </c:pt>
+                <c:pt idx="1">
+                  <c:v>5.51</c:v>
+                </c:pt>
+                <c:pt idx="2">
+                  <c:v>5.82</c:v>
+                </c:pt>
+                <c:pt idx="3">
+                  <c:v>6.4</c:v>
+                </c:pt>
+                <c:pt idx="4">
+                  <c:v>7.24</c:v>
+                </c:pt>
+                <c:pt idx="5">
+                  <c:v>7.66</c:v>
+                </c:pt>
+                <c:pt idx="6">
+                  <c:v>7.95</c:v>
+                </c:pt>
+                <c:pt idx="7">
+                  <c:v>8.67</c:v>
+                </c:pt>
+                <c:pt idx="8">
+                  <c:v>9.17</c:v>
+                </c:pt>
+                <c:pt idx="9">
+                  <c:v>9.73</c:v>
+                </c:pt>
+              </c:numCache>
+            </c:numRef>
+          </c:val>
+          <c:smooth val="0"/>
+          <c:extLst>
+            <c:ext xmlns:c16="http://schemas.microsoft.com/office/drawing/2014/chart" uri="{C3380CC4-5D6E-409C-BE32-E72D297353CC}">
+              <c16:uniqueId val="{00000003-AA29-4ACF-8742-C5CC4CAA95AC}"/>
+            </c:ext>
+          </c:extLst>
+        </c:ser>
+        <c:dLbls>
+          <c:showLegendKey val="0"/>
+          <c:showVal val="0"/>
+          <c:showCatName val="0"/>
+          <c:showSerName val="0"/>
+          <c:showPercent val="0"/>
+          <c:showBubbleSize val="0"/>
+        </c:dLbls>
+        <c:marker val="1"/>
+        <c:smooth val="0"/>
+        <c:axId val="715546560"/>
+        <c:axId val="715546888"/>
+      </c:lineChart>
+      <c:catAx>
+        <c:axId val="715546560"/>
+        <c:scaling>
+          <c:orientation val="minMax"/>
+        </c:scaling>
+        <c:delete val="0"/>
+        <c:axPos val="b"/>
+        <c:title>
+          <c:tx>
+            <c:rich>
+              <a:bodyPr rot="0" spcFirstLastPara="1" vertOverflow="ellipsis" vert="horz" wrap="square" anchor="ctr" anchorCtr="1"/>
+              <a:lstStyle/>
+              <a:p>
+                <a:pPr>
+                  <a:defRPr sz="1400" b="0" i="0" u="none" strike="noStrike" kern="1200" baseline="0">
+                    <a:solidFill>
+                      <a:schemeClr val="tx1">
+                        <a:lumMod val="65000"/>
+                        <a:lumOff val="35000"/>
+                      </a:schemeClr>
+                    </a:solidFill>
+                    <a:latin typeface="+mn-lt"/>
+                    <a:ea typeface="+mn-ea"/>
+                    <a:cs typeface="+mn-cs"/>
+                  </a:defRPr>
+                </a:pPr>
+                <a:r>
+                  <a:rPr lang="en-US"/>
+                  <a:t>Distance between two goals.</a:t>
+                </a:r>
+              </a:p>
+            </c:rich>
+          </c:tx>
+          <c:layout/>
+          <c:overlay val="0"/>
+          <c:spPr>
+            <a:noFill/>
+            <a:ln>
+              <a:noFill/>
+            </a:ln>
+            <a:effectLst/>
+          </c:spPr>
+          <c:txPr>
+            <a:bodyPr rot="0" spcFirstLastPara="1" vertOverflow="ellipsis" vert="horz" wrap="square" anchor="ctr" anchorCtr="1"/>
+            <a:lstStyle/>
+            <a:p>
+              <a:pPr>
+                <a:defRPr sz="1400" b="0" i="0" u="none" strike="noStrike" kern="1200" baseline="0">
+                  <a:solidFill>
+                    <a:schemeClr val="tx1">
+                      <a:lumMod val="65000"/>
+                      <a:lumOff val="35000"/>
+                    </a:schemeClr>
+                  </a:solidFill>
+                  <a:latin typeface="+mn-lt"/>
+                  <a:ea typeface="+mn-ea"/>
+                  <a:cs typeface="+mn-cs"/>
+                </a:defRPr>
+              </a:pPr>
+              <a:endParaRPr lang="he-IL"/>
+            </a:p>
+          </c:txPr>
+        </c:title>
+        <c:numFmt formatCode="General" sourceLinked="1"/>
+        <c:majorTickMark val="none"/>
+        <c:minorTickMark val="none"/>
+        <c:tickLblPos val="nextTo"/>
+        <c:spPr>
+          <a:noFill/>
+          <a:ln w="9525" cap="flat" cmpd="sng" algn="ctr">
+            <a:solidFill>
+              <a:schemeClr val="tx1">
+                <a:lumMod val="15000"/>
+                <a:lumOff val="85000"/>
+              </a:schemeClr>
+            </a:solidFill>
+            <a:round/>
+          </a:ln>
+          <a:effectLst/>
+        </c:spPr>
+        <c:txPr>
+          <a:bodyPr rot="-60000000" spcFirstLastPara="1" vertOverflow="ellipsis" vert="horz" wrap="square" anchor="ctr" anchorCtr="1"/>
+          <a:lstStyle/>
+          <a:p>
+            <a:pPr>
+              <a:defRPr sz="1400" b="0" i="0" u="none" strike="noStrike" kern="1200" baseline="0">
+                <a:solidFill>
+                  <a:schemeClr val="tx1">
+                    <a:lumMod val="65000"/>
+                    <a:lumOff val="35000"/>
+                  </a:schemeClr>
+                </a:solidFill>
+                <a:latin typeface="+mn-lt"/>
+                <a:ea typeface="+mn-ea"/>
+                <a:cs typeface="+mn-cs"/>
+              </a:defRPr>
+            </a:pPr>
+            <a:endParaRPr lang="he-IL"/>
+          </a:p>
+        </c:txPr>
+        <c:crossAx val="715546888"/>
+        <c:crosses val="autoZero"/>
+        <c:auto val="1"/>
+        <c:lblAlgn val="ctr"/>
+        <c:lblOffset val="100"/>
+        <c:noMultiLvlLbl val="0"/>
+      </c:catAx>
+      <c:valAx>
+        <c:axId val="715546888"/>
+        <c:scaling>
+          <c:orientation val="minMax"/>
+          <c:max val="10"/>
+          <c:min val="2"/>
+        </c:scaling>
+        <c:delete val="0"/>
+        <c:axPos val="l"/>
+        <c:majorGridlines>
+          <c:spPr>
+            <a:ln w="9525" cap="flat" cmpd="sng" algn="ctr">
+              <a:solidFill>
+                <a:schemeClr val="tx1">
+                  <a:lumMod val="15000"/>
+                  <a:lumOff val="85000"/>
+                </a:schemeClr>
+              </a:solidFill>
+              <a:round/>
+            </a:ln>
+            <a:effectLst/>
+          </c:spPr>
+        </c:majorGridlines>
+        <c:title>
+          <c:tx>
+            <c:rich>
+              <a:bodyPr rot="-5400000" spcFirstLastPara="1" vertOverflow="ellipsis" vert="horz" wrap="square" anchor="ctr" anchorCtr="1"/>
+              <a:lstStyle/>
+              <a:p>
+                <a:pPr>
+                  <a:defRPr sz="1400" b="0" i="0" u="none" strike="noStrike" kern="1200" baseline="0">
+                    <a:solidFill>
+                      <a:schemeClr val="tx1">
+                        <a:lumMod val="65000"/>
+                        <a:lumOff val="35000"/>
+                      </a:schemeClr>
+                    </a:solidFill>
+                    <a:latin typeface="+mn-lt"/>
+                    <a:ea typeface="+mn-ea"/>
+                    <a:cs typeface="+mn-cs"/>
+                  </a:defRPr>
+                </a:pPr>
+                <a:r>
+                  <a:rPr lang="en-US"/>
+                  <a:t>Time (ms.)</a:t>
+                </a:r>
+              </a:p>
+            </c:rich>
+          </c:tx>
+          <c:layout/>
+          <c:overlay val="0"/>
+          <c:spPr>
+            <a:noFill/>
+            <a:ln>
+              <a:noFill/>
+            </a:ln>
+            <a:effectLst/>
+          </c:spPr>
+          <c:txPr>
+            <a:bodyPr rot="-5400000" spcFirstLastPara="1" vertOverflow="ellipsis" vert="horz" wrap="square" anchor="ctr" anchorCtr="1"/>
+            <a:lstStyle/>
+            <a:p>
+              <a:pPr>
+                <a:defRPr sz="1400" b="0" i="0" u="none" strike="noStrike" kern="1200" baseline="0">
+                  <a:solidFill>
+                    <a:schemeClr val="tx1">
+                      <a:lumMod val="65000"/>
+                      <a:lumOff val="35000"/>
+                    </a:schemeClr>
+                  </a:solidFill>
+                  <a:latin typeface="+mn-lt"/>
+                  <a:ea typeface="+mn-ea"/>
+                  <a:cs typeface="+mn-cs"/>
+                </a:defRPr>
+              </a:pPr>
+              <a:endParaRPr lang="he-IL"/>
+            </a:p>
+          </c:txPr>
+        </c:title>
+        <c:numFmt formatCode="General" sourceLinked="1"/>
+        <c:majorTickMark val="out"/>
+        <c:minorTickMark val="in"/>
+        <c:tickLblPos val="nextTo"/>
+        <c:spPr>
+          <a:noFill/>
+          <a:ln>
+            <a:solidFill>
+              <a:schemeClr val="accent1"/>
+            </a:solidFill>
+          </a:ln>
+          <a:effectLst/>
+        </c:spPr>
+        <c:txPr>
+          <a:bodyPr rot="-60000000" spcFirstLastPara="1" vertOverflow="ellipsis" vert="horz" wrap="square" anchor="ctr" anchorCtr="1"/>
+          <a:lstStyle/>
+          <a:p>
+            <a:pPr>
+              <a:defRPr sz="1400" b="0" i="0" u="none" strike="noStrike" kern="1200" baseline="0">
+                <a:solidFill>
+                  <a:schemeClr val="tx1">
+                    <a:lumMod val="65000"/>
+                    <a:lumOff val="35000"/>
+                  </a:schemeClr>
+                </a:solidFill>
+                <a:latin typeface="+mn-lt"/>
+                <a:ea typeface="+mn-ea"/>
+                <a:cs typeface="+mn-cs"/>
+              </a:defRPr>
+            </a:pPr>
+            <a:endParaRPr lang="he-IL"/>
+          </a:p>
+        </c:txPr>
+        <c:crossAx val="715546560"/>
+        <c:crosses val="autoZero"/>
+        <c:crossBetween val="between"/>
+        <c:minorUnit val="0.5"/>
+      </c:valAx>
+      <c:spPr>
+        <a:noFill/>
+        <a:ln>
+          <a:noFill/>
+        </a:ln>
+        <a:effectLst/>
+      </c:spPr>
+    </c:plotArea>
+    <c:legend>
+      <c:legendPos val="r"/>
+      <c:layout>
+        <c:manualLayout>
+          <c:xMode val="edge"/>
+          <c:yMode val="edge"/>
+          <c:x val="0.12522702220244894"/>
+          <c:y val="5.3905932381597702E-2"/>
+          <c:w val="0.27354692574563405"/>
+          <c:h val="0.29475953488009843"/>
+        </c:manualLayout>
+      </c:layout>
+      <c:overlay val="0"/>
+      <c:spPr>
+        <a:solidFill>
+          <a:schemeClr val="bg1"/>
+        </a:solidFill>
+        <a:ln>
+          <a:noFill/>
+        </a:ln>
+        <a:effectLst/>
+      </c:spPr>
+      <c:txPr>
+        <a:bodyPr rot="0" spcFirstLastPara="1" vertOverflow="ellipsis" vert="horz" wrap="square" anchor="ctr" anchorCtr="1"/>
+        <a:lstStyle/>
+        <a:p>
+          <a:pPr>
+            <a:defRPr sz="1400" b="0" i="0" u="none" strike="noStrike" kern="1200" baseline="0">
+              <a:solidFill>
+                <a:schemeClr val="tx1">
+                  <a:lumMod val="65000"/>
+                  <a:lumOff val="35000"/>
+                </a:schemeClr>
+              </a:solidFill>
+              <a:latin typeface="+mn-lt"/>
+              <a:ea typeface="+mn-ea"/>
+              <a:cs typeface="+mn-cs"/>
+            </a:defRPr>
+          </a:pPr>
+          <a:endParaRPr lang="he-IL"/>
+        </a:p>
+      </c:txPr>
+    </c:legend>
+    <c:plotVisOnly val="1"/>
+    <c:dispBlanksAs val="gap"/>
+    <c:showDLblsOverMax val="0"/>
+  </c:chart>
+  <c:spPr>
+    <a:noFill/>
+    <a:ln>
+      <a:noFill/>
+    </a:ln>
+    <a:effectLst/>
+  </c:spPr>
+  <c:txPr>
+    <a:bodyPr/>
+    <a:lstStyle/>
+    <a:p>
+      <a:pPr>
+        <a:defRPr sz="1400"/>
+      </a:pPr>
+      <a:endParaRPr lang="he-IL"/>
+    </a:p>
+  </c:txPr>
+  <c:externalData r:id="rId3">
+    <c:autoUpdate val="0"/>
+  </c:externalData>
+</c:chartSpace>
+</file>
+
+<file path=ppt/charts/chart16.xml><?xml version="1.0" encoding="utf-8"?>
+<c:chartSpace xmlns:c="http://schemas.openxmlformats.org/drawingml/2006/chart" xmlns:a="http://schemas.openxmlformats.org/drawingml/2006/main" xmlns:r="http://schemas.openxmlformats.org/officeDocument/2006/relationships" xmlns:c16r2="http://schemas.microsoft.com/office/drawing/2015/06/chart">
+  <c:date1904 val="0"/>
+  <c:lang val="en-US"/>
+  <c:roundedCorners val="0"/>
+  <mc:AlternateContent xmlns:mc="http://schemas.openxmlformats.org/markup-compatibility/2006">
+    <mc:Choice xmlns:c14="http://schemas.microsoft.com/office/drawing/2007/8/2/chart" Requires="c14">
+      <c14:style val="102"/>
+    </mc:Choice>
+    <mc:Fallback>
+      <c:style val="2"/>
+    </mc:Fallback>
+  </mc:AlternateContent>
+  <c:chart>
+    <c:autoTitleDeleted val="1"/>
+    <c:plotArea>
+      <c:layout>
+        <c:manualLayout>
+          <c:layoutTarget val="inner"/>
+          <c:xMode val="edge"/>
+          <c:yMode val="edge"/>
+          <c:x val="0.18588711204913819"/>
+          <c:y val="5.3527980535279802E-2"/>
+          <c:w val="0.75661525556728093"/>
+          <c:h val="0.73351188765637876"/>
+        </c:manualLayout>
+      </c:layout>
+      <c:lineChart>
+        <c:grouping val="standard"/>
+        <c:varyColors val="0"/>
+        <c:ser>
+          <c:idx val="0"/>
+          <c:order val="0"/>
+          <c:tx>
+            <c:v>k x A*</c:v>
+          </c:tx>
+          <c:spPr>
+            <a:ln w="28575" cap="rnd">
+              <a:solidFill>
+                <a:schemeClr val="accent3"/>
+              </a:solidFill>
+              <a:round/>
+            </a:ln>
+            <a:effectLst/>
+          </c:spPr>
+          <c:marker>
+            <c:symbol val="diamond"/>
+            <c:size val="8"/>
+            <c:spPr>
+              <a:solidFill>
+                <a:schemeClr val="accent3"/>
+              </a:solidFill>
+              <a:ln w="9525">
+                <a:solidFill>
+                  <a:schemeClr val="tx1"/>
+                </a:solidFill>
+              </a:ln>
+              <a:effectLst/>
+            </c:spPr>
+          </c:marker>
+          <c:cat>
+            <c:numRef>
+              <c:f>Pancake20.Analysis!$A$2:$A$22</c:f>
+              <c:numCache>
+                <c:formatCode>General</c:formatCode>
+                <c:ptCount val="21"/>
+                <c:pt idx="0">
+                  <c:v>1</c:v>
+                </c:pt>
+                <c:pt idx="1">
+                  <c:v>2</c:v>
+                </c:pt>
+                <c:pt idx="2">
+                  <c:v>3</c:v>
+                </c:pt>
+                <c:pt idx="3">
+                  <c:v>4</c:v>
+                </c:pt>
+                <c:pt idx="4">
+                  <c:v>5</c:v>
+                </c:pt>
+                <c:pt idx="5">
+                  <c:v>6</c:v>
+                </c:pt>
+                <c:pt idx="6">
+                  <c:v>7</c:v>
+                </c:pt>
+                <c:pt idx="7">
+                  <c:v>8</c:v>
+                </c:pt>
+                <c:pt idx="8">
+                  <c:v>9</c:v>
+                </c:pt>
+                <c:pt idx="9">
+                  <c:v>10</c:v>
+                </c:pt>
+                <c:pt idx="10">
+                  <c:v>11</c:v>
+                </c:pt>
+                <c:pt idx="11">
+                  <c:v>12</c:v>
+                </c:pt>
+                <c:pt idx="12">
+                  <c:v>13</c:v>
+                </c:pt>
+                <c:pt idx="13">
+                  <c:v>14</c:v>
+                </c:pt>
+                <c:pt idx="14">
+                  <c:v>15</c:v>
+                </c:pt>
+                <c:pt idx="15">
+                  <c:v>16</c:v>
+                </c:pt>
+                <c:pt idx="16">
+                  <c:v>17</c:v>
+                </c:pt>
+                <c:pt idx="17">
+                  <c:v>18</c:v>
+                </c:pt>
+                <c:pt idx="18">
+                  <c:v>19</c:v>
+                </c:pt>
+                <c:pt idx="19">
+                  <c:v>20</c:v>
+                </c:pt>
+                <c:pt idx="20">
+                  <c:v>21</c:v>
+                </c:pt>
+              </c:numCache>
+            </c:numRef>
+          </c:cat>
+          <c:val>
+            <c:numRef>
+              <c:f>Pancake20.Analysis!$C$25:$C$45</c:f>
+              <c:numCache>
+                <c:formatCode>General</c:formatCode>
+                <c:ptCount val="21"/>
+                <c:pt idx="0">
+                  <c:v>1</c:v>
+                </c:pt>
+                <c:pt idx="1">
+                  <c:v>1</c:v>
+                </c:pt>
+                <c:pt idx="2">
+                  <c:v>1</c:v>
+                </c:pt>
+                <c:pt idx="3">
+                  <c:v>1</c:v>
+                </c:pt>
+                <c:pt idx="4">
+                  <c:v>1</c:v>
+                </c:pt>
+                <c:pt idx="5">
+                  <c:v>1</c:v>
+                </c:pt>
+                <c:pt idx="6">
+                  <c:v>1</c:v>
+                </c:pt>
+                <c:pt idx="7">
+                  <c:v>1</c:v>
+                </c:pt>
+                <c:pt idx="8">
+                  <c:v>1</c:v>
+                </c:pt>
+                <c:pt idx="9">
+                  <c:v>1</c:v>
+                </c:pt>
+                <c:pt idx="10">
+                  <c:v>1</c:v>
+                </c:pt>
+                <c:pt idx="11">
+                  <c:v>1</c:v>
+                </c:pt>
+                <c:pt idx="12">
+                  <c:v>1</c:v>
+                </c:pt>
+                <c:pt idx="13">
+                  <c:v>1</c:v>
+                </c:pt>
+                <c:pt idx="14">
+                  <c:v>1</c:v>
+                </c:pt>
+                <c:pt idx="15">
+                  <c:v>1</c:v>
+                </c:pt>
+                <c:pt idx="16">
+                  <c:v>1</c:v>
+                </c:pt>
+                <c:pt idx="17">
+                  <c:v>1</c:v>
+                </c:pt>
+                <c:pt idx="18">
+                  <c:v>1</c:v>
+                </c:pt>
+                <c:pt idx="19">
+                  <c:v>1</c:v>
+                </c:pt>
+                <c:pt idx="20">
+                  <c:v>1</c:v>
+                </c:pt>
+              </c:numCache>
+            </c:numRef>
+          </c:val>
+          <c:smooth val="0"/>
+          <c:extLst>
+            <c:ext xmlns:c16="http://schemas.microsoft.com/office/drawing/2014/chart" uri="{C3380CC4-5D6E-409C-BE32-E72D297353CC}">
+              <c16:uniqueId val="{00000000-1E4F-4464-89E8-B87935114CC8}"/>
+            </c:ext>
+          </c:extLst>
+        </c:ser>
+        <c:ser>
+          <c:idx val="6"/>
+          <c:order val="1"/>
+          <c:tx>
+            <c:v>Lazy kA*min</c:v>
+          </c:tx>
+          <c:spPr>
+            <a:ln w="31750" cap="rnd">
+              <a:solidFill>
+                <a:schemeClr val="accent1"/>
+              </a:solidFill>
+              <a:round/>
+            </a:ln>
+            <a:effectLst/>
+          </c:spPr>
+          <c:marker>
+            <c:symbol val="triangle"/>
+            <c:size val="9"/>
+            <c:spPr>
+              <a:solidFill>
+                <a:schemeClr val="accent1"/>
+              </a:solidFill>
+              <a:ln w="9525">
+                <a:solidFill>
+                  <a:schemeClr val="tx1"/>
+                </a:solidFill>
+              </a:ln>
+              <a:effectLst/>
+            </c:spPr>
+          </c:marker>
+          <c:cat>
+            <c:numRef>
+              <c:f>Pancake20.Analysis!$A$2:$A$22</c:f>
+              <c:numCache>
+                <c:formatCode>General</c:formatCode>
+                <c:ptCount val="21"/>
+                <c:pt idx="0">
+                  <c:v>1</c:v>
+                </c:pt>
+                <c:pt idx="1">
+                  <c:v>2</c:v>
+                </c:pt>
+                <c:pt idx="2">
+                  <c:v>3</c:v>
+                </c:pt>
+                <c:pt idx="3">
+                  <c:v>4</c:v>
+                </c:pt>
+                <c:pt idx="4">
+                  <c:v>5</c:v>
+                </c:pt>
+                <c:pt idx="5">
+                  <c:v>6</c:v>
+                </c:pt>
+                <c:pt idx="6">
+                  <c:v>7</c:v>
+                </c:pt>
+                <c:pt idx="7">
+                  <c:v>8</c:v>
+                </c:pt>
+                <c:pt idx="8">
+                  <c:v>9</c:v>
+                </c:pt>
+                <c:pt idx="9">
+                  <c:v>10</c:v>
+                </c:pt>
+                <c:pt idx="10">
+                  <c:v>11</c:v>
+                </c:pt>
+                <c:pt idx="11">
+                  <c:v>12</c:v>
+                </c:pt>
+                <c:pt idx="12">
+                  <c:v>13</c:v>
+                </c:pt>
+                <c:pt idx="13">
+                  <c:v>14</c:v>
+                </c:pt>
+                <c:pt idx="14">
+                  <c:v>15</c:v>
+                </c:pt>
+                <c:pt idx="15">
+                  <c:v>16</c:v>
+                </c:pt>
+                <c:pt idx="16">
+                  <c:v>17</c:v>
+                </c:pt>
+                <c:pt idx="17">
+                  <c:v>18</c:v>
+                </c:pt>
+                <c:pt idx="18">
+                  <c:v>19</c:v>
+                </c:pt>
+                <c:pt idx="19">
+                  <c:v>20</c:v>
+                </c:pt>
+                <c:pt idx="20">
+                  <c:v>21</c:v>
+                </c:pt>
+              </c:numCache>
+            </c:numRef>
+          </c:cat>
+          <c:val>
+            <c:numRef>
+              <c:f>Pancake20.Analysis!$E$25:$E$45</c:f>
+              <c:numCache>
+                <c:formatCode>General</c:formatCode>
+                <c:ptCount val="21"/>
+                <c:pt idx="0">
+                  <c:v>0.82720140407150522</c:v>
+                </c:pt>
+                <c:pt idx="1">
+                  <c:v>0.83146387104492681</c:v>
+                </c:pt>
+                <c:pt idx="2">
+                  <c:v>1.0117627095592143</c:v>
+                </c:pt>
+                <c:pt idx="3">
+                  <c:v>0.9849922548532859</c:v>
+                </c:pt>
+                <c:pt idx="4">
+                  <c:v>1.0099235076547639</c:v>
+                </c:pt>
+                <c:pt idx="5">
+                  <c:v>1.0438892437965179</c:v>
+                </c:pt>
+                <c:pt idx="6">
+                  <c:v>1.0966182200158598</c:v>
+                </c:pt>
+                <c:pt idx="7">
+                  <c:v>1.0854552496931307</c:v>
+                </c:pt>
+                <c:pt idx="8">
+                  <c:v>1.1474339882947839</c:v>
+                </c:pt>
+                <c:pt idx="9">
+                  <c:v>1.1027975370061891</c:v>
+                </c:pt>
+                <c:pt idx="10">
+                  <c:v>1.0940044470566257</c:v>
+                </c:pt>
+                <c:pt idx="11">
+                  <c:v>1.1046301421419289</c:v>
+                </c:pt>
+                <c:pt idx="12">
+                  <c:v>1.1424394417253878</c:v>
+                </c:pt>
+                <c:pt idx="13">
+                  <c:v>1.1093587183224702</c:v>
+                </c:pt>
+                <c:pt idx="14">
+                  <c:v>1.0791856128523913</c:v>
+                </c:pt>
+                <c:pt idx="15">
+                  <c:v>1.1163336170440044</c:v>
+                </c:pt>
+                <c:pt idx="16">
+                  <c:v>1.1396613091854981</c:v>
+                </c:pt>
+                <c:pt idx="17">
+                  <c:v>1.1782667649621499</c:v>
+                </c:pt>
+                <c:pt idx="18">
+                  <c:v>1.1980038930541728</c:v>
+                </c:pt>
+                <c:pt idx="19">
+                  <c:v>1.1843411323649851</c:v>
+                </c:pt>
+                <c:pt idx="20">
+                  <c:v>1.1927365870682474</c:v>
+                </c:pt>
+              </c:numCache>
+            </c:numRef>
+          </c:val>
+          <c:smooth val="0"/>
+          <c:extLst>
+            <c:ext xmlns:c16="http://schemas.microsoft.com/office/drawing/2014/chart" uri="{C3380CC4-5D6E-409C-BE32-E72D297353CC}">
+              <c16:uniqueId val="{00000001-1E4F-4464-89E8-B87935114CC8}"/>
+            </c:ext>
+          </c:extLst>
+        </c:ser>
+        <c:dLbls>
+          <c:showLegendKey val="0"/>
+          <c:showVal val="0"/>
+          <c:showCatName val="0"/>
+          <c:showSerName val="0"/>
+          <c:showPercent val="0"/>
+          <c:showBubbleSize val="0"/>
+        </c:dLbls>
+        <c:marker val="1"/>
+        <c:smooth val="0"/>
+        <c:axId val="715546560"/>
+        <c:axId val="715546888"/>
+      </c:lineChart>
+      <c:catAx>
+        <c:axId val="715546560"/>
+        <c:scaling>
+          <c:orientation val="minMax"/>
+        </c:scaling>
+        <c:delete val="0"/>
+        <c:axPos val="b"/>
+        <c:title>
+          <c:tx>
+            <c:rich>
+              <a:bodyPr rot="0" spcFirstLastPara="1" vertOverflow="ellipsis" vert="horz" wrap="square" anchor="ctr" anchorCtr="1"/>
+              <a:lstStyle/>
+              <a:p>
+                <a:pPr>
+                  <a:defRPr sz="1400" b="0" i="0" u="none" strike="noStrike" kern="1200" baseline="0">
+                    <a:solidFill>
+                      <a:schemeClr val="tx1">
+                        <a:lumMod val="65000"/>
+                        <a:lumOff val="35000"/>
+                      </a:schemeClr>
+                    </a:solidFill>
+                    <a:latin typeface="+mn-lt"/>
+                    <a:ea typeface="+mn-ea"/>
+                    <a:cs typeface="+mn-cs"/>
+                  </a:defRPr>
+                </a:pPr>
+                <a:r>
+                  <a:rPr lang="en-US"/>
+                  <a:t>Distance between two goals</a:t>
+                </a:r>
+              </a:p>
+            </c:rich>
+          </c:tx>
+          <c:layout/>
+          <c:overlay val="0"/>
+          <c:spPr>
+            <a:noFill/>
+            <a:ln>
+              <a:noFill/>
+            </a:ln>
+            <a:effectLst/>
+          </c:spPr>
+          <c:txPr>
+            <a:bodyPr rot="0" spcFirstLastPara="1" vertOverflow="ellipsis" vert="horz" wrap="square" anchor="ctr" anchorCtr="1"/>
+            <a:lstStyle/>
+            <a:p>
+              <a:pPr>
+                <a:defRPr sz="1400" b="0" i="0" u="none" strike="noStrike" kern="1200" baseline="0">
+                  <a:solidFill>
+                    <a:schemeClr val="tx1">
+                      <a:lumMod val="65000"/>
+                      <a:lumOff val="35000"/>
+                    </a:schemeClr>
+                  </a:solidFill>
+                  <a:latin typeface="+mn-lt"/>
+                  <a:ea typeface="+mn-ea"/>
+                  <a:cs typeface="+mn-cs"/>
+                </a:defRPr>
+              </a:pPr>
+              <a:endParaRPr lang="he-IL"/>
+            </a:p>
+          </c:txPr>
+        </c:title>
+        <c:numFmt formatCode="General" sourceLinked="1"/>
+        <c:majorTickMark val="none"/>
+        <c:minorTickMark val="none"/>
+        <c:tickLblPos val="nextTo"/>
+        <c:spPr>
+          <a:noFill/>
+          <a:ln w="9525" cap="flat" cmpd="sng" algn="ctr">
+            <a:solidFill>
+              <a:schemeClr val="tx1">
+                <a:lumMod val="15000"/>
+                <a:lumOff val="85000"/>
+              </a:schemeClr>
+            </a:solidFill>
+            <a:round/>
+          </a:ln>
+          <a:effectLst/>
+        </c:spPr>
+        <c:txPr>
+          <a:bodyPr rot="-60000000" spcFirstLastPara="1" vertOverflow="ellipsis" vert="horz" wrap="square" anchor="ctr" anchorCtr="1"/>
+          <a:lstStyle/>
+          <a:p>
+            <a:pPr>
+              <a:defRPr sz="1400" b="0" i="0" u="none" strike="noStrike" kern="1200" baseline="0">
+                <a:solidFill>
+                  <a:schemeClr val="tx1">
+                    <a:lumMod val="65000"/>
+                    <a:lumOff val="35000"/>
+                  </a:schemeClr>
+                </a:solidFill>
+                <a:latin typeface="+mn-lt"/>
+                <a:ea typeface="+mn-ea"/>
+                <a:cs typeface="+mn-cs"/>
+              </a:defRPr>
+            </a:pPr>
+            <a:endParaRPr lang="he-IL"/>
+          </a:p>
+        </c:txPr>
+        <c:crossAx val="715546888"/>
+        <c:crosses val="autoZero"/>
+        <c:auto val="1"/>
+        <c:lblAlgn val="ctr"/>
+        <c:lblOffset val="100"/>
+        <c:noMultiLvlLbl val="0"/>
+      </c:catAx>
+      <c:valAx>
+        <c:axId val="715546888"/>
+        <c:scaling>
+          <c:orientation val="minMax"/>
+          <c:max val="1.4"/>
+          <c:min val="0.8"/>
+        </c:scaling>
+        <c:delete val="0"/>
+        <c:axPos val="l"/>
+        <c:majorGridlines>
+          <c:spPr>
+            <a:ln w="9525" cap="flat" cmpd="sng" algn="ctr">
+              <a:solidFill>
+                <a:schemeClr val="tx1">
+                  <a:lumMod val="15000"/>
+                  <a:lumOff val="85000"/>
+                </a:schemeClr>
+              </a:solidFill>
+              <a:round/>
+            </a:ln>
+            <a:effectLst/>
+          </c:spPr>
+        </c:majorGridlines>
+        <c:title>
+          <c:tx>
+            <c:rich>
+              <a:bodyPr rot="-5400000" spcFirstLastPara="1" vertOverflow="ellipsis" vert="horz" wrap="square" anchor="ctr" anchorCtr="1"/>
+              <a:lstStyle/>
+              <a:p>
+                <a:pPr>
+                  <a:defRPr sz="1400" b="0" i="0" u="none" strike="noStrike" kern="1200" baseline="0">
+                    <a:solidFill>
+                      <a:schemeClr val="tx1">
+                        <a:lumMod val="65000"/>
+                        <a:lumOff val="35000"/>
+                      </a:schemeClr>
+                    </a:solidFill>
+                    <a:latin typeface="+mn-lt"/>
+                    <a:ea typeface="+mn-ea"/>
+                    <a:cs typeface="+mn-cs"/>
+                  </a:defRPr>
+                </a:pPr>
+                <a:r>
+                  <a:rPr lang="en-US"/>
+                  <a:t>Time relative to Per Goal</a:t>
+                </a:r>
+              </a:p>
+            </c:rich>
+          </c:tx>
+          <c:layout/>
+          <c:overlay val="0"/>
+          <c:spPr>
+            <a:noFill/>
+            <a:ln>
+              <a:noFill/>
+            </a:ln>
+            <a:effectLst/>
+          </c:spPr>
+          <c:txPr>
+            <a:bodyPr rot="-5400000" spcFirstLastPara="1" vertOverflow="ellipsis" vert="horz" wrap="square" anchor="ctr" anchorCtr="1"/>
+            <a:lstStyle/>
+            <a:p>
+              <a:pPr>
+                <a:defRPr sz="1400" b="0" i="0" u="none" strike="noStrike" kern="1200" baseline="0">
+                  <a:solidFill>
+                    <a:schemeClr val="tx1">
+                      <a:lumMod val="65000"/>
+                      <a:lumOff val="35000"/>
+                    </a:schemeClr>
+                  </a:solidFill>
+                  <a:latin typeface="+mn-lt"/>
+                  <a:ea typeface="+mn-ea"/>
+                  <a:cs typeface="+mn-cs"/>
+                </a:defRPr>
+              </a:pPr>
+              <a:endParaRPr lang="he-IL"/>
+            </a:p>
+          </c:txPr>
+        </c:title>
+        <c:numFmt formatCode="General" sourceLinked="1"/>
+        <c:majorTickMark val="out"/>
+        <c:minorTickMark val="in"/>
+        <c:tickLblPos val="nextTo"/>
+        <c:spPr>
+          <a:noFill/>
+          <a:ln>
+            <a:solidFill>
+              <a:schemeClr val="accent1"/>
+            </a:solidFill>
+          </a:ln>
+          <a:effectLst/>
+        </c:spPr>
+        <c:txPr>
+          <a:bodyPr rot="-60000000" spcFirstLastPara="1" vertOverflow="ellipsis" vert="horz" wrap="square" anchor="ctr" anchorCtr="1"/>
+          <a:lstStyle/>
+          <a:p>
+            <a:pPr>
+              <a:defRPr sz="1400" b="0" i="0" u="none" strike="noStrike" kern="1200" baseline="0">
+                <a:solidFill>
+                  <a:schemeClr val="tx1">
+                    <a:lumMod val="65000"/>
+                    <a:lumOff val="35000"/>
+                  </a:schemeClr>
+                </a:solidFill>
+                <a:latin typeface="+mn-lt"/>
+                <a:ea typeface="+mn-ea"/>
+                <a:cs typeface="+mn-cs"/>
+              </a:defRPr>
+            </a:pPr>
+            <a:endParaRPr lang="he-IL"/>
+          </a:p>
+        </c:txPr>
+        <c:crossAx val="715546560"/>
+        <c:crossesAt val="1"/>
+        <c:crossBetween val="between"/>
+        <c:majorUnit val="0.1"/>
+      </c:valAx>
+      <c:spPr>
+        <a:noFill/>
+        <a:ln>
+          <a:noFill/>
+        </a:ln>
+        <a:effectLst/>
+      </c:spPr>
+    </c:plotArea>
+    <c:legend>
+      <c:legendPos val="r"/>
+      <c:layout>
+        <c:manualLayout>
+          <c:xMode val="edge"/>
+          <c:yMode val="edge"/>
+          <c:x val="0.18999648239846309"/>
+          <c:y val="7.2383853478169252E-2"/>
+          <c:w val="0.40175338907378844"/>
+          <c:h val="0.22749506676628925"/>
+        </c:manualLayout>
+      </c:layout>
+      <c:overlay val="0"/>
+      <c:spPr>
+        <a:noFill/>
+        <a:ln>
+          <a:noFill/>
+        </a:ln>
+        <a:effectLst/>
+      </c:spPr>
+      <c:txPr>
+        <a:bodyPr rot="0" spcFirstLastPara="1" vertOverflow="ellipsis" vert="horz" wrap="square" anchor="ctr" anchorCtr="1"/>
+        <a:lstStyle/>
+        <a:p>
+          <a:pPr>
+            <a:defRPr sz="1400" b="0" i="0" u="none" strike="noStrike" kern="1200" baseline="0">
+              <a:solidFill>
+                <a:schemeClr val="tx1">
+                  <a:lumMod val="65000"/>
+                  <a:lumOff val="35000"/>
+                </a:schemeClr>
+              </a:solidFill>
+              <a:latin typeface="+mn-lt"/>
+              <a:ea typeface="+mn-ea"/>
+              <a:cs typeface="+mn-cs"/>
+            </a:defRPr>
+          </a:pPr>
+          <a:endParaRPr lang="he-IL"/>
+        </a:p>
+      </c:txPr>
+    </c:legend>
+    <c:plotVisOnly val="1"/>
+    <c:dispBlanksAs val="gap"/>
+    <c:showDLblsOverMax val="0"/>
+  </c:chart>
+  <c:spPr>
+    <a:noFill/>
+    <a:ln>
+      <a:noFill/>
+    </a:ln>
+    <a:effectLst/>
+  </c:spPr>
+  <c:txPr>
+    <a:bodyPr/>
+    <a:lstStyle/>
+    <a:p>
+      <a:pPr>
+        <a:defRPr sz="1400"/>
+      </a:pPr>
+      <a:endParaRPr lang="he-IL"/>
+    </a:p>
+  </c:txPr>
+  <c:externalData r:id="rId3">
+    <c:autoUpdate val="0"/>
+  </c:externalData>
 </c:chartSpace>
 </file>
 
@@ -3811,7 +5380,6 @@
           </a:p>
         </c:rich>
       </c:tx>
-      <c:layout/>
       <c:overlay val="0"/>
       <c:spPr>
         <a:noFill/>
@@ -4184,7 +5752,6 @@
               </a:p>
             </c:rich>
           </c:tx>
-          <c:layout/>
           <c:overlay val="0"/>
           <c:spPr>
             <a:noFill/>
@@ -4307,7 +5874,6 @@
               </a:p>
             </c:rich>
           </c:tx>
-          <c:layout/>
           <c:overlay val="0"/>
           <c:spPr>
             <a:noFill/>
@@ -4451,7 +6017,6 @@
           </a:p>
         </c:rich>
       </c:tx>
-      <c:layout/>
       <c:overlay val="0"/>
       <c:spPr>
         <a:noFill/>
@@ -4824,7 +6389,6 @@
               </a:p>
             </c:rich>
           </c:tx>
-          <c:layout/>
           <c:overlay val="0"/>
           <c:spPr>
             <a:noFill/>
@@ -4947,7 +6511,6 @@
               </a:p>
             </c:rich>
           </c:tx>
-          <c:layout/>
           <c:overlay val="0"/>
           <c:spPr>
             <a:noFill/>
@@ -5470,7 +7033,6 @@
               </a:p>
             </c:rich>
           </c:tx>
-          <c:layout/>
           <c:overlay val="0"/>
           <c:spPr>
             <a:noFill/>
@@ -5593,7 +7155,6 @@
               </a:p>
             </c:rich>
           </c:tx>
-          <c:layout/>
           <c:overlay val="0"/>
           <c:spPr>
             <a:noFill/>
@@ -6117,7 +7678,6 @@
               </a:p>
             </c:rich>
           </c:tx>
-          <c:layout/>
           <c:overlay val="0"/>
           <c:spPr>
             <a:noFill/>
@@ -6240,7 +7800,6 @@
               </a:p>
             </c:rich>
           </c:tx>
-          <c:layout/>
           <c:overlay val="0"/>
           <c:spPr>
             <a:noFill/>
@@ -6384,7 +7943,6 @@
           </a:p>
         </c:rich>
       </c:tx>
-      <c:layout/>
       <c:overlay val="0"/>
       <c:spPr>
         <a:noFill/>
@@ -6757,7 +8315,6 @@
               </a:p>
             </c:rich>
           </c:tx>
-          <c:layout/>
           <c:overlay val="0"/>
           <c:spPr>
             <a:noFill/>
@@ -6880,7 +8437,6 @@
               </a:p>
             </c:rich>
           </c:tx>
-          <c:layout/>
           <c:overlay val="0"/>
           <c:spPr>
             <a:noFill/>
@@ -6958,7 +8514,6 @@
     </c:plotArea>
     <c:legend>
       <c:legendPos val="r"/>
-      <c:layout/>
       <c:overlay val="0"/>
       <c:spPr>
         <a:noFill/>
@@ -7055,7 +8610,6 @@
           </a:p>
         </c:rich>
       </c:tx>
-      <c:layout/>
       <c:overlay val="0"/>
       <c:spPr>
         <a:noFill/>
@@ -7461,7 +9015,6 @@
               </a:p>
             </c:rich>
           </c:tx>
-          <c:layout/>
           <c:overlay val="0"/>
           <c:spPr>
             <a:noFill/>
@@ -7584,7 +9137,6 @@
               </a:p>
             </c:rich>
           </c:tx>
-          <c:layout/>
           <c:overlay val="0"/>
           <c:spPr>
             <a:noFill/>
@@ -7662,7 +9214,6 @@
     </c:plotArea>
     <c:legend>
       <c:legendPos val="r"/>
-      <c:layout/>
       <c:overlay val="0"/>
       <c:spPr>
         <a:noFill/>
@@ -7759,7 +9310,6 @@
           </a:p>
         </c:rich>
       </c:tx>
-      <c:layout/>
       <c:overlay val="0"/>
       <c:spPr>
         <a:noFill/>
@@ -8132,7 +9682,6 @@
               </a:p>
             </c:rich>
           </c:tx>
-          <c:layout/>
           <c:overlay val="0"/>
           <c:spPr>
             <a:noFill/>
@@ -8255,7 +9804,6 @@
               </a:p>
             </c:rich>
           </c:tx>
-          <c:layout/>
           <c:overlay val="0"/>
           <c:spPr>
             <a:noFill/>
@@ -8333,7 +9881,6 @@
     </c:plotArea>
     <c:legend>
       <c:legendPos val="r"/>
-      <c:layout/>
       <c:overlay val="0"/>
       <c:spPr>
         <a:noFill/>
@@ -8438,8 +9985,8 @@
         <c:manualLayout>
           <c:xMode val="edge"/>
           <c:yMode val="edge"/>
-          <c:x val="0.33764422282278544"/>
-          <c:y val="1.5037593984962405E-2"/>
+          <c:x val="0.30672672333455703"/>
+          <c:y val="2.4847937558998067E-2"/>
         </c:manualLayout>
       </c:layout>
       <c:overlay val="0"/>
@@ -9186,6 +10733,86 @@
 </file>
 
 <file path=ppt/charts/colors14.xml><?xml version="1.0" encoding="utf-8"?>
+<cs:colorStyle xmlns:cs="http://schemas.microsoft.com/office/drawing/2012/chartStyle" xmlns:a="http://schemas.openxmlformats.org/drawingml/2006/main" meth="cycle" id="10">
+  <a:schemeClr val="accent1"/>
+  <a:schemeClr val="accent2"/>
+  <a:schemeClr val="accent3"/>
+  <a:schemeClr val="accent4"/>
+  <a:schemeClr val="accent5"/>
+  <a:schemeClr val="accent6"/>
+  <cs:variation/>
+  <cs:variation>
+    <a:lumMod val="60000"/>
+  </cs:variation>
+  <cs:variation>
+    <a:lumMod val="80000"/>
+    <a:lumOff val="20000"/>
+  </cs:variation>
+  <cs:variation>
+    <a:lumMod val="80000"/>
+  </cs:variation>
+  <cs:variation>
+    <a:lumMod val="60000"/>
+    <a:lumOff val="40000"/>
+  </cs:variation>
+  <cs:variation>
+    <a:lumMod val="50000"/>
+  </cs:variation>
+  <cs:variation>
+    <a:lumMod val="70000"/>
+    <a:lumOff val="30000"/>
+  </cs:variation>
+  <cs:variation>
+    <a:lumMod val="70000"/>
+  </cs:variation>
+  <cs:variation>
+    <a:lumMod val="50000"/>
+    <a:lumOff val="50000"/>
+  </cs:variation>
+</cs:colorStyle>
+</file>
+
+<file path=ppt/charts/colors15.xml><?xml version="1.0" encoding="utf-8"?>
+<cs:colorStyle xmlns:cs="http://schemas.microsoft.com/office/drawing/2012/chartStyle" xmlns:a="http://schemas.openxmlformats.org/drawingml/2006/main" meth="cycle" id="10">
+  <a:schemeClr val="accent1"/>
+  <a:schemeClr val="accent2"/>
+  <a:schemeClr val="accent3"/>
+  <a:schemeClr val="accent4"/>
+  <a:schemeClr val="accent5"/>
+  <a:schemeClr val="accent6"/>
+  <cs:variation/>
+  <cs:variation>
+    <a:lumMod val="60000"/>
+  </cs:variation>
+  <cs:variation>
+    <a:lumMod val="80000"/>
+    <a:lumOff val="20000"/>
+  </cs:variation>
+  <cs:variation>
+    <a:lumMod val="80000"/>
+  </cs:variation>
+  <cs:variation>
+    <a:lumMod val="60000"/>
+    <a:lumOff val="40000"/>
+  </cs:variation>
+  <cs:variation>
+    <a:lumMod val="50000"/>
+  </cs:variation>
+  <cs:variation>
+    <a:lumMod val="70000"/>
+    <a:lumOff val="30000"/>
+  </cs:variation>
+  <cs:variation>
+    <a:lumMod val="70000"/>
+  </cs:variation>
+  <cs:variation>
+    <a:lumMod val="50000"/>
+    <a:lumOff val="50000"/>
+  </cs:variation>
+</cs:colorStyle>
+</file>
+
+<file path=ppt/charts/colors16.xml><?xml version="1.0" encoding="utf-8"?>
 <cs:colorStyle xmlns:cs="http://schemas.microsoft.com/office/drawing/2012/chartStyle" xmlns:a="http://schemas.openxmlformats.org/drawingml/2006/main" meth="cycle" id="10">
   <a:schemeClr val="accent1"/>
   <a:schemeClr val="accent2"/>
@@ -12061,6 +13688,1012 @@
 </file>
 
 <file path=ppt/charts/style14.xml><?xml version="1.0" encoding="utf-8"?>
+<cs:chartStyle xmlns:cs="http://schemas.microsoft.com/office/drawing/2012/chartStyle" xmlns:a="http://schemas.openxmlformats.org/drawingml/2006/main" id="332">
+  <cs:axisTitle>
+    <cs:lnRef idx="0"/>
+    <cs:fillRef idx="0"/>
+    <cs:effectRef idx="0"/>
+    <cs:fontRef idx="minor">
+      <a:schemeClr val="tx1">
+        <a:lumMod val="65000"/>
+        <a:lumOff val="35000"/>
+      </a:schemeClr>
+    </cs:fontRef>
+    <cs:defRPr sz="1000" kern="1200"/>
+  </cs:axisTitle>
+  <cs:categoryAxis>
+    <cs:lnRef idx="0"/>
+    <cs:fillRef idx="0"/>
+    <cs:effectRef idx="0"/>
+    <cs:fontRef idx="minor">
+      <a:schemeClr val="tx1">
+        <a:lumMod val="65000"/>
+        <a:lumOff val="35000"/>
+      </a:schemeClr>
+    </cs:fontRef>
+    <cs:spPr>
+      <a:ln w="9525" cap="flat" cmpd="sng" algn="ctr">
+        <a:solidFill>
+          <a:schemeClr val="tx1">
+            <a:lumMod val="15000"/>
+            <a:lumOff val="85000"/>
+          </a:schemeClr>
+        </a:solidFill>
+        <a:round/>
+      </a:ln>
+    </cs:spPr>
+    <cs:defRPr sz="900" kern="1200"/>
+  </cs:categoryAxis>
+  <cs:chartArea mods="allowNoFillOverride allowNoLineOverride">
+    <cs:lnRef idx="0"/>
+    <cs:fillRef idx="0"/>
+    <cs:effectRef idx="0"/>
+    <cs:fontRef idx="minor">
+      <a:schemeClr val="tx1"/>
+    </cs:fontRef>
+    <cs:spPr>
+      <a:solidFill>
+        <a:schemeClr val="bg1"/>
+      </a:solidFill>
+      <a:ln w="9525" cap="flat" cmpd="sng" algn="ctr">
+        <a:solidFill>
+          <a:schemeClr val="tx1">
+            <a:lumMod val="15000"/>
+            <a:lumOff val="85000"/>
+          </a:schemeClr>
+        </a:solidFill>
+        <a:round/>
+      </a:ln>
+    </cs:spPr>
+    <cs:defRPr sz="1000" kern="1200"/>
+  </cs:chartArea>
+  <cs:dataLabel>
+    <cs:lnRef idx="0"/>
+    <cs:fillRef idx="0"/>
+    <cs:effectRef idx="0"/>
+    <cs:fontRef idx="minor">
+      <a:schemeClr val="tx1">
+        <a:lumMod val="75000"/>
+        <a:lumOff val="25000"/>
+      </a:schemeClr>
+    </cs:fontRef>
+    <cs:defRPr sz="900" kern="1200"/>
+  </cs:dataLabel>
+  <cs:dataLabelCallout>
+    <cs:lnRef idx="0"/>
+    <cs:fillRef idx="0"/>
+    <cs:effectRef idx="0"/>
+    <cs:fontRef idx="minor">
+      <a:schemeClr val="dk1">
+        <a:lumMod val="65000"/>
+        <a:lumOff val="35000"/>
+      </a:schemeClr>
+    </cs:fontRef>
+    <cs:spPr>
+      <a:solidFill>
+        <a:schemeClr val="lt1"/>
+      </a:solidFill>
+      <a:ln>
+        <a:solidFill>
+          <a:schemeClr val="dk1">
+            <a:lumMod val="25000"/>
+            <a:lumOff val="75000"/>
+          </a:schemeClr>
+        </a:solidFill>
+      </a:ln>
+    </cs:spPr>
+    <cs:defRPr sz="900" kern="1200"/>
+    <cs:bodyPr rot="0" spcFirstLastPara="1" vertOverflow="clip" horzOverflow="clip" vert="horz" wrap="square" lIns="36576" tIns="18288" rIns="36576" bIns="18288" anchor="ctr" anchorCtr="1">
+      <a:spAutoFit/>
+    </cs:bodyPr>
+  </cs:dataLabelCallout>
+  <cs:dataPoint>
+    <cs:lnRef idx="0"/>
+    <cs:fillRef idx="1">
+      <cs:styleClr val="auto"/>
+    </cs:fillRef>
+    <cs:effectRef idx="0"/>
+    <cs:fontRef idx="minor">
+      <a:schemeClr val="tx1"/>
+    </cs:fontRef>
+  </cs:dataPoint>
+  <cs:dataPoint3D>
+    <cs:lnRef idx="0"/>
+    <cs:fillRef idx="1">
+      <cs:styleClr val="auto"/>
+    </cs:fillRef>
+    <cs:effectRef idx="0"/>
+    <cs:fontRef idx="minor">
+      <a:schemeClr val="tx1"/>
+    </cs:fontRef>
+  </cs:dataPoint3D>
+  <cs:dataPointLine>
+    <cs:lnRef idx="0">
+      <cs:styleClr val="auto"/>
+    </cs:lnRef>
+    <cs:fillRef idx="1"/>
+    <cs:effectRef idx="0"/>
+    <cs:fontRef idx="minor">
+      <a:schemeClr val="tx1"/>
+    </cs:fontRef>
+    <cs:spPr>
+      <a:ln w="28575" cap="rnd">
+        <a:solidFill>
+          <a:schemeClr val="phClr"/>
+        </a:solidFill>
+        <a:round/>
+      </a:ln>
+    </cs:spPr>
+  </cs:dataPointLine>
+  <cs:dataPointMarker>
+    <cs:lnRef idx="0">
+      <cs:styleClr val="auto"/>
+    </cs:lnRef>
+    <cs:fillRef idx="1">
+      <cs:styleClr val="auto"/>
+    </cs:fillRef>
+    <cs:effectRef idx="0"/>
+    <cs:fontRef idx="minor">
+      <a:schemeClr val="tx1"/>
+    </cs:fontRef>
+    <cs:spPr>
+      <a:ln w="9525">
+        <a:solidFill>
+          <a:schemeClr val="phClr"/>
+        </a:solidFill>
+      </a:ln>
+    </cs:spPr>
+  </cs:dataPointMarker>
+  <cs:dataPointMarkerLayout symbol="circle" size="5"/>
+  <cs:dataPointWireframe>
+    <cs:lnRef idx="0">
+      <cs:styleClr val="auto"/>
+    </cs:lnRef>
+    <cs:fillRef idx="1"/>
+    <cs:effectRef idx="0"/>
+    <cs:fontRef idx="minor">
+      <a:schemeClr val="tx1"/>
+    </cs:fontRef>
+    <cs:spPr>
+      <a:ln w="9525" cap="rnd">
+        <a:solidFill>
+          <a:schemeClr val="phClr"/>
+        </a:solidFill>
+        <a:round/>
+      </a:ln>
+    </cs:spPr>
+  </cs:dataPointWireframe>
+  <cs:dataTable>
+    <cs:lnRef idx="0"/>
+    <cs:fillRef idx="0"/>
+    <cs:effectRef idx="0"/>
+    <cs:fontRef idx="minor">
+      <a:schemeClr val="tx1">
+        <a:lumMod val="65000"/>
+        <a:lumOff val="35000"/>
+      </a:schemeClr>
+    </cs:fontRef>
+    <cs:spPr>
+      <a:noFill/>
+      <a:ln w="9525" cap="flat" cmpd="sng" algn="ctr">
+        <a:solidFill>
+          <a:schemeClr val="tx1">
+            <a:lumMod val="15000"/>
+            <a:lumOff val="85000"/>
+          </a:schemeClr>
+        </a:solidFill>
+        <a:round/>
+      </a:ln>
+    </cs:spPr>
+    <cs:defRPr sz="900" kern="1200"/>
+  </cs:dataTable>
+  <cs:downBar>
+    <cs:lnRef idx="0"/>
+    <cs:fillRef idx="0"/>
+    <cs:effectRef idx="0"/>
+    <cs:fontRef idx="minor">
+      <a:schemeClr val="dk1"/>
+    </cs:fontRef>
+    <cs:spPr>
+      <a:solidFill>
+        <a:schemeClr val="dk1">
+          <a:lumMod val="65000"/>
+          <a:lumOff val="35000"/>
+        </a:schemeClr>
+      </a:solidFill>
+      <a:ln w="9525">
+        <a:solidFill>
+          <a:schemeClr val="tx1">
+            <a:lumMod val="65000"/>
+            <a:lumOff val="35000"/>
+          </a:schemeClr>
+        </a:solidFill>
+      </a:ln>
+    </cs:spPr>
+  </cs:downBar>
+  <cs:dropLine>
+    <cs:lnRef idx="0"/>
+    <cs:fillRef idx="0"/>
+    <cs:effectRef idx="0"/>
+    <cs:fontRef idx="minor">
+      <a:schemeClr val="tx1"/>
+    </cs:fontRef>
+    <cs:spPr>
+      <a:ln w="9525" cap="flat" cmpd="sng" algn="ctr">
+        <a:solidFill>
+          <a:schemeClr val="tx1">
+            <a:lumMod val="35000"/>
+            <a:lumOff val="65000"/>
+          </a:schemeClr>
+        </a:solidFill>
+        <a:round/>
+      </a:ln>
+    </cs:spPr>
+  </cs:dropLine>
+  <cs:errorBar>
+    <cs:lnRef idx="0"/>
+    <cs:fillRef idx="0"/>
+    <cs:effectRef idx="0"/>
+    <cs:fontRef idx="minor">
+      <a:schemeClr val="tx1"/>
+    </cs:fontRef>
+    <cs:spPr>
+      <a:ln w="9525" cap="flat" cmpd="sng" algn="ctr">
+        <a:solidFill>
+          <a:schemeClr val="tx1">
+            <a:lumMod val="65000"/>
+            <a:lumOff val="35000"/>
+          </a:schemeClr>
+        </a:solidFill>
+        <a:round/>
+      </a:ln>
+    </cs:spPr>
+  </cs:errorBar>
+  <cs:floor>
+    <cs:lnRef idx="0"/>
+    <cs:fillRef idx="0"/>
+    <cs:effectRef idx="0"/>
+    <cs:fontRef idx="minor">
+      <a:schemeClr val="tx1"/>
+    </cs:fontRef>
+    <cs:spPr>
+      <a:noFill/>
+      <a:ln>
+        <a:noFill/>
+      </a:ln>
+    </cs:spPr>
+  </cs:floor>
+  <cs:gridlineMajor>
+    <cs:lnRef idx="0"/>
+    <cs:fillRef idx="0"/>
+    <cs:effectRef idx="0"/>
+    <cs:fontRef idx="minor">
+      <a:schemeClr val="tx1"/>
+    </cs:fontRef>
+    <cs:spPr>
+      <a:ln w="9525" cap="flat" cmpd="sng" algn="ctr">
+        <a:solidFill>
+          <a:schemeClr val="tx1">
+            <a:lumMod val="15000"/>
+            <a:lumOff val="85000"/>
+          </a:schemeClr>
+        </a:solidFill>
+        <a:round/>
+      </a:ln>
+    </cs:spPr>
+  </cs:gridlineMajor>
+  <cs:gridlineMinor>
+    <cs:lnRef idx="0"/>
+    <cs:fillRef idx="0"/>
+    <cs:effectRef idx="0"/>
+    <cs:fontRef idx="minor">
+      <a:schemeClr val="tx1"/>
+    </cs:fontRef>
+    <cs:spPr>
+      <a:ln w="9525" cap="flat" cmpd="sng" algn="ctr">
+        <a:solidFill>
+          <a:schemeClr val="tx1">
+            <a:lumMod val="5000"/>
+            <a:lumOff val="95000"/>
+          </a:schemeClr>
+        </a:solidFill>
+        <a:round/>
+      </a:ln>
+    </cs:spPr>
+  </cs:gridlineMinor>
+  <cs:hiLoLine>
+    <cs:lnRef idx="0"/>
+    <cs:fillRef idx="0"/>
+    <cs:effectRef idx="0"/>
+    <cs:fontRef idx="minor">
+      <a:schemeClr val="tx1"/>
+    </cs:fontRef>
+    <cs:spPr>
+      <a:ln w="9525" cap="flat" cmpd="sng" algn="ctr">
+        <a:solidFill>
+          <a:schemeClr val="tx1">
+            <a:lumMod val="75000"/>
+            <a:lumOff val="25000"/>
+          </a:schemeClr>
+        </a:solidFill>
+        <a:round/>
+      </a:ln>
+    </cs:spPr>
+  </cs:hiLoLine>
+  <cs:leaderLine>
+    <cs:lnRef idx="0"/>
+    <cs:fillRef idx="0"/>
+    <cs:effectRef idx="0"/>
+    <cs:fontRef idx="minor">
+      <a:schemeClr val="tx1"/>
+    </cs:fontRef>
+    <cs:spPr>
+      <a:ln w="9525" cap="flat" cmpd="sng" algn="ctr">
+        <a:solidFill>
+          <a:schemeClr val="tx1">
+            <a:lumMod val="35000"/>
+            <a:lumOff val="65000"/>
+          </a:schemeClr>
+        </a:solidFill>
+        <a:round/>
+      </a:ln>
+    </cs:spPr>
+  </cs:leaderLine>
+  <cs:legend>
+    <cs:lnRef idx="0"/>
+    <cs:fillRef idx="0"/>
+    <cs:effectRef idx="0"/>
+    <cs:fontRef idx="minor">
+      <a:schemeClr val="tx1">
+        <a:lumMod val="65000"/>
+        <a:lumOff val="35000"/>
+      </a:schemeClr>
+    </cs:fontRef>
+    <cs:defRPr sz="900" kern="1200"/>
+  </cs:legend>
+  <cs:plotArea mods="allowNoFillOverride allowNoLineOverride">
+    <cs:lnRef idx="0"/>
+    <cs:fillRef idx="0"/>
+    <cs:effectRef idx="0"/>
+    <cs:fontRef idx="minor">
+      <a:schemeClr val="tx1"/>
+    </cs:fontRef>
+  </cs:plotArea>
+  <cs:plotArea3D mods="allowNoFillOverride allowNoLineOverride">
+    <cs:lnRef idx="0"/>
+    <cs:fillRef idx="0"/>
+    <cs:effectRef idx="0"/>
+    <cs:fontRef idx="minor">
+      <a:schemeClr val="tx1"/>
+    </cs:fontRef>
+  </cs:plotArea3D>
+  <cs:seriesAxis>
+    <cs:lnRef idx="0"/>
+    <cs:fillRef idx="0"/>
+    <cs:effectRef idx="0"/>
+    <cs:fontRef idx="minor">
+      <a:schemeClr val="tx1">
+        <a:lumMod val="65000"/>
+        <a:lumOff val="35000"/>
+      </a:schemeClr>
+    </cs:fontRef>
+    <cs:defRPr sz="900" kern="1200"/>
+  </cs:seriesAxis>
+  <cs:seriesLine>
+    <cs:lnRef idx="0"/>
+    <cs:fillRef idx="0"/>
+    <cs:effectRef idx="0"/>
+    <cs:fontRef idx="minor">
+      <a:schemeClr val="tx1"/>
+    </cs:fontRef>
+    <cs:spPr>
+      <a:ln w="9525" cap="flat" cmpd="sng" algn="ctr">
+        <a:solidFill>
+          <a:schemeClr val="tx1">
+            <a:lumMod val="35000"/>
+            <a:lumOff val="65000"/>
+          </a:schemeClr>
+        </a:solidFill>
+        <a:round/>
+      </a:ln>
+    </cs:spPr>
+  </cs:seriesLine>
+  <cs:title>
+    <cs:lnRef idx="0"/>
+    <cs:fillRef idx="0"/>
+    <cs:effectRef idx="0"/>
+    <cs:fontRef idx="minor">
+      <a:schemeClr val="tx1">
+        <a:lumMod val="65000"/>
+        <a:lumOff val="35000"/>
+      </a:schemeClr>
+    </cs:fontRef>
+    <cs:defRPr sz="1400" b="0" kern="1200" spc="0" baseline="0"/>
+  </cs:title>
+  <cs:trendline>
+    <cs:lnRef idx="0">
+      <cs:styleClr val="auto"/>
+    </cs:lnRef>
+    <cs:fillRef idx="0"/>
+    <cs:effectRef idx="0"/>
+    <cs:fontRef idx="minor">
+      <a:schemeClr val="tx1"/>
+    </cs:fontRef>
+    <cs:spPr>
+      <a:ln w="19050" cap="rnd">
+        <a:solidFill>
+          <a:schemeClr val="phClr"/>
+        </a:solidFill>
+        <a:prstDash val="sysDot"/>
+      </a:ln>
+    </cs:spPr>
+  </cs:trendline>
+  <cs:trendlineLabel>
+    <cs:lnRef idx="0"/>
+    <cs:fillRef idx="0"/>
+    <cs:effectRef idx="0"/>
+    <cs:fontRef idx="minor">
+      <a:schemeClr val="tx1">
+        <a:lumMod val="65000"/>
+        <a:lumOff val="35000"/>
+      </a:schemeClr>
+    </cs:fontRef>
+    <cs:defRPr sz="900" kern="1200"/>
+  </cs:trendlineLabel>
+  <cs:upBar>
+    <cs:lnRef idx="0"/>
+    <cs:fillRef idx="0"/>
+    <cs:effectRef idx="0"/>
+    <cs:fontRef idx="minor">
+      <a:schemeClr val="dk1"/>
+    </cs:fontRef>
+    <cs:spPr>
+      <a:solidFill>
+        <a:schemeClr val="lt1"/>
+      </a:solidFill>
+      <a:ln w="9525">
+        <a:solidFill>
+          <a:schemeClr val="tx1">
+            <a:lumMod val="15000"/>
+            <a:lumOff val="85000"/>
+          </a:schemeClr>
+        </a:solidFill>
+      </a:ln>
+    </cs:spPr>
+  </cs:upBar>
+  <cs:valueAxis>
+    <cs:lnRef idx="0"/>
+    <cs:fillRef idx="0"/>
+    <cs:effectRef idx="0"/>
+    <cs:fontRef idx="minor">
+      <a:schemeClr val="tx1">
+        <a:lumMod val="65000"/>
+        <a:lumOff val="35000"/>
+      </a:schemeClr>
+    </cs:fontRef>
+    <cs:defRPr sz="900" kern="1200"/>
+  </cs:valueAxis>
+  <cs:wall>
+    <cs:lnRef idx="0"/>
+    <cs:fillRef idx="0"/>
+    <cs:effectRef idx="0"/>
+    <cs:fontRef idx="minor">
+      <a:schemeClr val="tx1"/>
+    </cs:fontRef>
+    <cs:spPr>
+      <a:noFill/>
+      <a:ln>
+        <a:noFill/>
+      </a:ln>
+    </cs:spPr>
+  </cs:wall>
+</cs:chartStyle>
+</file>
+
+<file path=ppt/charts/style15.xml><?xml version="1.0" encoding="utf-8"?>
+<cs:chartStyle xmlns:cs="http://schemas.microsoft.com/office/drawing/2012/chartStyle" xmlns:a="http://schemas.openxmlformats.org/drawingml/2006/main" id="332">
+  <cs:axisTitle>
+    <cs:lnRef idx="0"/>
+    <cs:fillRef idx="0"/>
+    <cs:effectRef idx="0"/>
+    <cs:fontRef idx="minor">
+      <a:schemeClr val="tx1">
+        <a:lumMod val="65000"/>
+        <a:lumOff val="35000"/>
+      </a:schemeClr>
+    </cs:fontRef>
+    <cs:defRPr sz="1000" kern="1200"/>
+  </cs:axisTitle>
+  <cs:categoryAxis>
+    <cs:lnRef idx="0"/>
+    <cs:fillRef idx="0"/>
+    <cs:effectRef idx="0"/>
+    <cs:fontRef idx="minor">
+      <a:schemeClr val="tx1">
+        <a:lumMod val="65000"/>
+        <a:lumOff val="35000"/>
+      </a:schemeClr>
+    </cs:fontRef>
+    <cs:spPr>
+      <a:ln w="9525" cap="flat" cmpd="sng" algn="ctr">
+        <a:solidFill>
+          <a:schemeClr val="tx1">
+            <a:lumMod val="15000"/>
+            <a:lumOff val="85000"/>
+          </a:schemeClr>
+        </a:solidFill>
+        <a:round/>
+      </a:ln>
+    </cs:spPr>
+    <cs:defRPr sz="900" kern="1200"/>
+  </cs:categoryAxis>
+  <cs:chartArea mods="allowNoFillOverride allowNoLineOverride">
+    <cs:lnRef idx="0"/>
+    <cs:fillRef idx="0"/>
+    <cs:effectRef idx="0"/>
+    <cs:fontRef idx="minor">
+      <a:schemeClr val="tx1"/>
+    </cs:fontRef>
+    <cs:spPr>
+      <a:solidFill>
+        <a:schemeClr val="bg1"/>
+      </a:solidFill>
+      <a:ln w="9525" cap="flat" cmpd="sng" algn="ctr">
+        <a:solidFill>
+          <a:schemeClr val="tx1">
+            <a:lumMod val="15000"/>
+            <a:lumOff val="85000"/>
+          </a:schemeClr>
+        </a:solidFill>
+        <a:round/>
+      </a:ln>
+    </cs:spPr>
+    <cs:defRPr sz="1000" kern="1200"/>
+  </cs:chartArea>
+  <cs:dataLabel>
+    <cs:lnRef idx="0"/>
+    <cs:fillRef idx="0"/>
+    <cs:effectRef idx="0"/>
+    <cs:fontRef idx="minor">
+      <a:schemeClr val="tx1">
+        <a:lumMod val="75000"/>
+        <a:lumOff val="25000"/>
+      </a:schemeClr>
+    </cs:fontRef>
+    <cs:defRPr sz="900" kern="1200"/>
+  </cs:dataLabel>
+  <cs:dataLabelCallout>
+    <cs:lnRef idx="0"/>
+    <cs:fillRef idx="0"/>
+    <cs:effectRef idx="0"/>
+    <cs:fontRef idx="minor">
+      <a:schemeClr val="dk1">
+        <a:lumMod val="65000"/>
+        <a:lumOff val="35000"/>
+      </a:schemeClr>
+    </cs:fontRef>
+    <cs:spPr>
+      <a:solidFill>
+        <a:schemeClr val="lt1"/>
+      </a:solidFill>
+      <a:ln>
+        <a:solidFill>
+          <a:schemeClr val="dk1">
+            <a:lumMod val="25000"/>
+            <a:lumOff val="75000"/>
+          </a:schemeClr>
+        </a:solidFill>
+      </a:ln>
+    </cs:spPr>
+    <cs:defRPr sz="900" kern="1200"/>
+    <cs:bodyPr rot="0" spcFirstLastPara="1" vertOverflow="clip" horzOverflow="clip" vert="horz" wrap="square" lIns="36576" tIns="18288" rIns="36576" bIns="18288" anchor="ctr" anchorCtr="1">
+      <a:spAutoFit/>
+    </cs:bodyPr>
+  </cs:dataLabelCallout>
+  <cs:dataPoint>
+    <cs:lnRef idx="0"/>
+    <cs:fillRef idx="1">
+      <cs:styleClr val="auto"/>
+    </cs:fillRef>
+    <cs:effectRef idx="0"/>
+    <cs:fontRef idx="minor">
+      <a:schemeClr val="tx1"/>
+    </cs:fontRef>
+  </cs:dataPoint>
+  <cs:dataPoint3D>
+    <cs:lnRef idx="0"/>
+    <cs:fillRef idx="1">
+      <cs:styleClr val="auto"/>
+    </cs:fillRef>
+    <cs:effectRef idx="0"/>
+    <cs:fontRef idx="minor">
+      <a:schemeClr val="tx1"/>
+    </cs:fontRef>
+  </cs:dataPoint3D>
+  <cs:dataPointLine>
+    <cs:lnRef idx="0">
+      <cs:styleClr val="auto"/>
+    </cs:lnRef>
+    <cs:fillRef idx="1"/>
+    <cs:effectRef idx="0"/>
+    <cs:fontRef idx="minor">
+      <a:schemeClr val="tx1"/>
+    </cs:fontRef>
+    <cs:spPr>
+      <a:ln w="28575" cap="rnd">
+        <a:solidFill>
+          <a:schemeClr val="phClr"/>
+        </a:solidFill>
+        <a:round/>
+      </a:ln>
+    </cs:spPr>
+  </cs:dataPointLine>
+  <cs:dataPointMarker>
+    <cs:lnRef idx="0">
+      <cs:styleClr val="auto"/>
+    </cs:lnRef>
+    <cs:fillRef idx="1">
+      <cs:styleClr val="auto"/>
+    </cs:fillRef>
+    <cs:effectRef idx="0"/>
+    <cs:fontRef idx="minor">
+      <a:schemeClr val="tx1"/>
+    </cs:fontRef>
+    <cs:spPr>
+      <a:ln w="9525">
+        <a:solidFill>
+          <a:schemeClr val="phClr"/>
+        </a:solidFill>
+      </a:ln>
+    </cs:spPr>
+  </cs:dataPointMarker>
+  <cs:dataPointMarkerLayout symbol="circle" size="5"/>
+  <cs:dataPointWireframe>
+    <cs:lnRef idx="0">
+      <cs:styleClr val="auto"/>
+    </cs:lnRef>
+    <cs:fillRef idx="1"/>
+    <cs:effectRef idx="0"/>
+    <cs:fontRef idx="minor">
+      <a:schemeClr val="tx1"/>
+    </cs:fontRef>
+    <cs:spPr>
+      <a:ln w="9525" cap="rnd">
+        <a:solidFill>
+          <a:schemeClr val="phClr"/>
+        </a:solidFill>
+        <a:round/>
+      </a:ln>
+    </cs:spPr>
+  </cs:dataPointWireframe>
+  <cs:dataTable>
+    <cs:lnRef idx="0"/>
+    <cs:fillRef idx="0"/>
+    <cs:effectRef idx="0"/>
+    <cs:fontRef idx="minor">
+      <a:schemeClr val="tx1">
+        <a:lumMod val="65000"/>
+        <a:lumOff val="35000"/>
+      </a:schemeClr>
+    </cs:fontRef>
+    <cs:spPr>
+      <a:noFill/>
+      <a:ln w="9525" cap="flat" cmpd="sng" algn="ctr">
+        <a:solidFill>
+          <a:schemeClr val="tx1">
+            <a:lumMod val="15000"/>
+            <a:lumOff val="85000"/>
+          </a:schemeClr>
+        </a:solidFill>
+        <a:round/>
+      </a:ln>
+    </cs:spPr>
+    <cs:defRPr sz="900" kern="1200"/>
+  </cs:dataTable>
+  <cs:downBar>
+    <cs:lnRef idx="0"/>
+    <cs:fillRef idx="0"/>
+    <cs:effectRef idx="0"/>
+    <cs:fontRef idx="minor">
+      <a:schemeClr val="dk1"/>
+    </cs:fontRef>
+    <cs:spPr>
+      <a:solidFill>
+        <a:schemeClr val="dk1">
+          <a:lumMod val="65000"/>
+          <a:lumOff val="35000"/>
+        </a:schemeClr>
+      </a:solidFill>
+      <a:ln w="9525">
+        <a:solidFill>
+          <a:schemeClr val="tx1">
+            <a:lumMod val="65000"/>
+            <a:lumOff val="35000"/>
+          </a:schemeClr>
+        </a:solidFill>
+      </a:ln>
+    </cs:spPr>
+  </cs:downBar>
+  <cs:dropLine>
+    <cs:lnRef idx="0"/>
+    <cs:fillRef idx="0"/>
+    <cs:effectRef idx="0"/>
+    <cs:fontRef idx="minor">
+      <a:schemeClr val="tx1"/>
+    </cs:fontRef>
+    <cs:spPr>
+      <a:ln w="9525" cap="flat" cmpd="sng" algn="ctr">
+        <a:solidFill>
+          <a:schemeClr val="tx1">
+            <a:lumMod val="35000"/>
+            <a:lumOff val="65000"/>
+          </a:schemeClr>
+        </a:solidFill>
+        <a:round/>
+      </a:ln>
+    </cs:spPr>
+  </cs:dropLine>
+  <cs:errorBar>
+    <cs:lnRef idx="0"/>
+    <cs:fillRef idx="0"/>
+    <cs:effectRef idx="0"/>
+    <cs:fontRef idx="minor">
+      <a:schemeClr val="tx1"/>
+    </cs:fontRef>
+    <cs:spPr>
+      <a:ln w="9525" cap="flat" cmpd="sng" algn="ctr">
+        <a:solidFill>
+          <a:schemeClr val="tx1">
+            <a:lumMod val="65000"/>
+            <a:lumOff val="35000"/>
+          </a:schemeClr>
+        </a:solidFill>
+        <a:round/>
+      </a:ln>
+    </cs:spPr>
+  </cs:errorBar>
+  <cs:floor>
+    <cs:lnRef idx="0"/>
+    <cs:fillRef idx="0"/>
+    <cs:effectRef idx="0"/>
+    <cs:fontRef idx="minor">
+      <a:schemeClr val="tx1"/>
+    </cs:fontRef>
+    <cs:spPr>
+      <a:noFill/>
+      <a:ln>
+        <a:noFill/>
+      </a:ln>
+    </cs:spPr>
+  </cs:floor>
+  <cs:gridlineMajor>
+    <cs:lnRef idx="0"/>
+    <cs:fillRef idx="0"/>
+    <cs:effectRef idx="0"/>
+    <cs:fontRef idx="minor">
+      <a:schemeClr val="tx1"/>
+    </cs:fontRef>
+    <cs:spPr>
+      <a:ln w="9525" cap="flat" cmpd="sng" algn="ctr">
+        <a:solidFill>
+          <a:schemeClr val="tx1">
+            <a:lumMod val="15000"/>
+            <a:lumOff val="85000"/>
+          </a:schemeClr>
+        </a:solidFill>
+        <a:round/>
+      </a:ln>
+    </cs:spPr>
+  </cs:gridlineMajor>
+  <cs:gridlineMinor>
+    <cs:lnRef idx="0"/>
+    <cs:fillRef idx="0"/>
+    <cs:effectRef idx="0"/>
+    <cs:fontRef idx="minor">
+      <a:schemeClr val="tx1"/>
+    </cs:fontRef>
+    <cs:spPr>
+      <a:ln w="9525" cap="flat" cmpd="sng" algn="ctr">
+        <a:solidFill>
+          <a:schemeClr val="tx1">
+            <a:lumMod val="5000"/>
+            <a:lumOff val="95000"/>
+          </a:schemeClr>
+        </a:solidFill>
+        <a:round/>
+      </a:ln>
+    </cs:spPr>
+  </cs:gridlineMinor>
+  <cs:hiLoLine>
+    <cs:lnRef idx="0"/>
+    <cs:fillRef idx="0"/>
+    <cs:effectRef idx="0"/>
+    <cs:fontRef idx="minor">
+      <a:schemeClr val="tx1"/>
+    </cs:fontRef>
+    <cs:spPr>
+      <a:ln w="9525" cap="flat" cmpd="sng" algn="ctr">
+        <a:solidFill>
+          <a:schemeClr val="tx1">
+            <a:lumMod val="75000"/>
+            <a:lumOff val="25000"/>
+          </a:schemeClr>
+        </a:solidFill>
+        <a:round/>
+      </a:ln>
+    </cs:spPr>
+  </cs:hiLoLine>
+  <cs:leaderLine>
+    <cs:lnRef idx="0"/>
+    <cs:fillRef idx="0"/>
+    <cs:effectRef idx="0"/>
+    <cs:fontRef idx="minor">
+      <a:schemeClr val="tx1"/>
+    </cs:fontRef>
+    <cs:spPr>
+      <a:ln w="9525" cap="flat" cmpd="sng" algn="ctr">
+        <a:solidFill>
+          <a:schemeClr val="tx1">
+            <a:lumMod val="35000"/>
+            <a:lumOff val="65000"/>
+          </a:schemeClr>
+        </a:solidFill>
+        <a:round/>
+      </a:ln>
+    </cs:spPr>
+  </cs:leaderLine>
+  <cs:legend>
+    <cs:lnRef idx="0"/>
+    <cs:fillRef idx="0"/>
+    <cs:effectRef idx="0"/>
+    <cs:fontRef idx="minor">
+      <a:schemeClr val="tx1">
+        <a:lumMod val="65000"/>
+        <a:lumOff val="35000"/>
+      </a:schemeClr>
+    </cs:fontRef>
+    <cs:defRPr sz="900" kern="1200"/>
+  </cs:legend>
+  <cs:plotArea mods="allowNoFillOverride allowNoLineOverride">
+    <cs:lnRef idx="0"/>
+    <cs:fillRef idx="0"/>
+    <cs:effectRef idx="0"/>
+    <cs:fontRef idx="minor">
+      <a:schemeClr val="tx1"/>
+    </cs:fontRef>
+  </cs:plotArea>
+  <cs:plotArea3D mods="allowNoFillOverride allowNoLineOverride">
+    <cs:lnRef idx="0"/>
+    <cs:fillRef idx="0"/>
+    <cs:effectRef idx="0"/>
+    <cs:fontRef idx="minor">
+      <a:schemeClr val="tx1"/>
+    </cs:fontRef>
+  </cs:plotArea3D>
+  <cs:seriesAxis>
+    <cs:lnRef idx="0"/>
+    <cs:fillRef idx="0"/>
+    <cs:effectRef idx="0"/>
+    <cs:fontRef idx="minor">
+      <a:schemeClr val="tx1">
+        <a:lumMod val="65000"/>
+        <a:lumOff val="35000"/>
+      </a:schemeClr>
+    </cs:fontRef>
+    <cs:defRPr sz="900" kern="1200"/>
+  </cs:seriesAxis>
+  <cs:seriesLine>
+    <cs:lnRef idx="0"/>
+    <cs:fillRef idx="0"/>
+    <cs:effectRef idx="0"/>
+    <cs:fontRef idx="minor">
+      <a:schemeClr val="tx1"/>
+    </cs:fontRef>
+    <cs:spPr>
+      <a:ln w="9525" cap="flat" cmpd="sng" algn="ctr">
+        <a:solidFill>
+          <a:schemeClr val="tx1">
+            <a:lumMod val="35000"/>
+            <a:lumOff val="65000"/>
+          </a:schemeClr>
+        </a:solidFill>
+        <a:round/>
+      </a:ln>
+    </cs:spPr>
+  </cs:seriesLine>
+  <cs:title>
+    <cs:lnRef idx="0"/>
+    <cs:fillRef idx="0"/>
+    <cs:effectRef idx="0"/>
+    <cs:fontRef idx="minor">
+      <a:schemeClr val="tx1">
+        <a:lumMod val="65000"/>
+        <a:lumOff val="35000"/>
+      </a:schemeClr>
+    </cs:fontRef>
+    <cs:defRPr sz="1400" b="0" kern="1200" spc="0" baseline="0"/>
+  </cs:title>
+  <cs:trendline>
+    <cs:lnRef idx="0">
+      <cs:styleClr val="auto"/>
+    </cs:lnRef>
+    <cs:fillRef idx="0"/>
+    <cs:effectRef idx="0"/>
+    <cs:fontRef idx="minor">
+      <a:schemeClr val="tx1"/>
+    </cs:fontRef>
+    <cs:spPr>
+      <a:ln w="19050" cap="rnd">
+        <a:solidFill>
+          <a:schemeClr val="phClr"/>
+        </a:solidFill>
+        <a:prstDash val="sysDot"/>
+      </a:ln>
+    </cs:spPr>
+  </cs:trendline>
+  <cs:trendlineLabel>
+    <cs:lnRef idx="0"/>
+    <cs:fillRef idx="0"/>
+    <cs:effectRef idx="0"/>
+    <cs:fontRef idx="minor">
+      <a:schemeClr val="tx1">
+        <a:lumMod val="65000"/>
+        <a:lumOff val="35000"/>
+      </a:schemeClr>
+    </cs:fontRef>
+    <cs:defRPr sz="900" kern="1200"/>
+  </cs:trendlineLabel>
+  <cs:upBar>
+    <cs:lnRef idx="0"/>
+    <cs:fillRef idx="0"/>
+    <cs:effectRef idx="0"/>
+    <cs:fontRef idx="minor">
+      <a:schemeClr val="dk1"/>
+    </cs:fontRef>
+    <cs:spPr>
+      <a:solidFill>
+        <a:schemeClr val="lt1"/>
+      </a:solidFill>
+      <a:ln w="9525">
+        <a:solidFill>
+          <a:schemeClr val="tx1">
+            <a:lumMod val="15000"/>
+            <a:lumOff val="85000"/>
+          </a:schemeClr>
+        </a:solidFill>
+      </a:ln>
+    </cs:spPr>
+  </cs:upBar>
+  <cs:valueAxis>
+    <cs:lnRef idx="0"/>
+    <cs:fillRef idx="0"/>
+    <cs:effectRef idx="0"/>
+    <cs:fontRef idx="minor">
+      <a:schemeClr val="tx1">
+        <a:lumMod val="65000"/>
+        <a:lumOff val="35000"/>
+      </a:schemeClr>
+    </cs:fontRef>
+    <cs:defRPr sz="900" kern="1200"/>
+  </cs:valueAxis>
+  <cs:wall>
+    <cs:lnRef idx="0"/>
+    <cs:fillRef idx="0"/>
+    <cs:effectRef idx="0"/>
+    <cs:fontRef idx="minor">
+      <a:schemeClr val="tx1"/>
+    </cs:fontRef>
+    <cs:spPr>
+      <a:noFill/>
+      <a:ln>
+        <a:noFill/>
+      </a:ln>
+    </cs:spPr>
+  </cs:wall>
+</cs:chartStyle>
+</file>
+
+<file path=ppt/charts/style16.xml><?xml version="1.0" encoding="utf-8"?>
 <cs:chartStyle xmlns:cs="http://schemas.microsoft.com/office/drawing/2012/chartStyle" xmlns:a="http://schemas.openxmlformats.org/drawingml/2006/main" id="332">
   <cs:axisTitle>
     <cs:lnRef idx="0"/>
@@ -16587,44 +19220,6 @@
 </cs:chartStyle>
 </file>
 
-<file path=ppt/drawings/drawing1.xml><?xml version="1.0" encoding="utf-8"?>
-<c:userShapes xmlns:c="http://schemas.openxmlformats.org/drawingml/2006/chart">
-  <cdr:relSizeAnchor xmlns:cdr="http://schemas.openxmlformats.org/drawingml/2006/chartDrawing">
-    <cdr:from>
-      <cdr:x>0.42254</cdr:x>
-      <cdr:y>0.2012</cdr:y>
-    </cdr:from>
-    <cdr:to>
-      <cdr:x>0.85603</cdr:x>
-      <cdr:y>0.45671</cdr:y>
-    </cdr:to>
-    <cdr:pic>
-      <cdr:nvPicPr>
-        <cdr:cNvPr id="2" name="Picture 1"/>
-        <cdr:cNvPicPr>
-          <a:picLocks xmlns:a="http://schemas.openxmlformats.org/drawingml/2006/main" noChangeAspect="1"/>
-        </cdr:cNvPicPr>
-      </cdr:nvPicPr>
-      <cdr:blipFill>
-        <a:blip xmlns:a="http://schemas.openxmlformats.org/drawingml/2006/main" xmlns:r="http://schemas.openxmlformats.org/officeDocument/2006/relationships" r:embed="rId1"/>
-        <a:stretch xmlns:a="http://schemas.openxmlformats.org/drawingml/2006/main">
-          <a:fillRect/>
-        </a:stretch>
-      </cdr:blipFill>
-      <cdr:spPr>
-        <a:xfrm xmlns:a="http://schemas.openxmlformats.org/drawingml/2006/main">
-          <a:off x="1020902" y="521855"/>
-          <a:ext cx="1047381" cy="662709"/>
-        </a:xfrm>
-        <a:prstGeom xmlns:a="http://schemas.openxmlformats.org/drawingml/2006/main" prst="rect">
-          <a:avLst/>
-        </a:prstGeom>
-      </cdr:spPr>
-    </cdr:pic>
-  </cdr:relSizeAnchor>
-</c:userShapes>
-</file>
-
 <file path=ppt/slideLayouts/slideLayout1.xml><?xml version="1.0" encoding="utf-8"?>
 <p:sldLayout xmlns:a="http://schemas.openxmlformats.org/drawingml/2006/main" xmlns:r="http://schemas.openxmlformats.org/officeDocument/2006/relationships" xmlns:p="http://schemas.openxmlformats.org/presentationml/2006/main" type="title" preserve="1">
   <p:cSld name="Title Slide">
@@ -16756,7 +19351,7 @@
           <a:p>
             <a:fld id="{2D53BDBD-A251-4BA0-ADCA-71664ACBDFF8}" type="datetimeFigureOut">
               <a:rPr lang="he-IL" smtClean="0"/>
-              <a:t>ב'/שבט/תשע"ז</a:t>
+              <a:t>ג'/שבט/תשע"ז</a:t>
             </a:fld>
             <a:endParaRPr lang="he-IL"/>
           </a:p>
@@ -16926,7 +19521,7 @@
           <a:p>
             <a:fld id="{2D53BDBD-A251-4BA0-ADCA-71664ACBDFF8}" type="datetimeFigureOut">
               <a:rPr lang="he-IL" smtClean="0"/>
-              <a:t>ב'/שבט/תשע"ז</a:t>
+              <a:t>ג'/שבט/תשע"ז</a:t>
             </a:fld>
             <a:endParaRPr lang="he-IL"/>
           </a:p>
@@ -17106,7 +19701,7 @@
           <a:p>
             <a:fld id="{2D53BDBD-A251-4BA0-ADCA-71664ACBDFF8}" type="datetimeFigureOut">
               <a:rPr lang="he-IL" smtClean="0"/>
-              <a:t>ב'/שבט/תשע"ז</a:t>
+              <a:t>ג'/שבט/תשע"ז</a:t>
             </a:fld>
             <a:endParaRPr lang="he-IL"/>
           </a:p>
@@ -17276,7 +19871,7 @@
           <a:p>
             <a:fld id="{2D53BDBD-A251-4BA0-ADCA-71664ACBDFF8}" type="datetimeFigureOut">
               <a:rPr lang="he-IL" smtClean="0"/>
-              <a:t>ב'/שבט/תשע"ז</a:t>
+              <a:t>ג'/שבט/תשע"ז</a:t>
             </a:fld>
             <a:endParaRPr lang="he-IL"/>
           </a:p>
@@ -17522,7 +20117,7 @@
           <a:p>
             <a:fld id="{2D53BDBD-A251-4BA0-ADCA-71664ACBDFF8}" type="datetimeFigureOut">
               <a:rPr lang="he-IL" smtClean="0"/>
-              <a:t>ב'/שבט/תשע"ז</a:t>
+              <a:t>ג'/שבט/תשע"ז</a:t>
             </a:fld>
             <a:endParaRPr lang="he-IL"/>
           </a:p>
@@ -17754,7 +20349,7 @@
           <a:p>
             <a:fld id="{2D53BDBD-A251-4BA0-ADCA-71664ACBDFF8}" type="datetimeFigureOut">
               <a:rPr lang="he-IL" smtClean="0"/>
-              <a:t>ב'/שבט/תשע"ז</a:t>
+              <a:t>ג'/שבט/תשע"ז</a:t>
             </a:fld>
             <a:endParaRPr lang="he-IL"/>
           </a:p>
@@ -18121,7 +20716,7 @@
           <a:p>
             <a:fld id="{2D53BDBD-A251-4BA0-ADCA-71664ACBDFF8}" type="datetimeFigureOut">
               <a:rPr lang="he-IL" smtClean="0"/>
-              <a:t>ב'/שבט/תשע"ז</a:t>
+              <a:t>ג'/שבט/תשע"ז</a:t>
             </a:fld>
             <a:endParaRPr lang="he-IL"/>
           </a:p>
@@ -18239,7 +20834,7 @@
           <a:p>
             <a:fld id="{2D53BDBD-A251-4BA0-ADCA-71664ACBDFF8}" type="datetimeFigureOut">
               <a:rPr lang="he-IL" smtClean="0"/>
-              <a:t>ב'/שבט/תשע"ז</a:t>
+              <a:t>ג'/שבט/תשע"ז</a:t>
             </a:fld>
             <a:endParaRPr lang="he-IL"/>
           </a:p>
@@ -18334,7 +20929,7 @@
           <a:p>
             <a:fld id="{2D53BDBD-A251-4BA0-ADCA-71664ACBDFF8}" type="datetimeFigureOut">
               <a:rPr lang="he-IL" smtClean="0"/>
-              <a:t>ב'/שבט/תשע"ז</a:t>
+              <a:t>ג'/שבט/תשע"ז</a:t>
             </a:fld>
             <a:endParaRPr lang="he-IL"/>
           </a:p>
@@ -18611,7 +21206,7 @@
           <a:p>
             <a:fld id="{2D53BDBD-A251-4BA0-ADCA-71664ACBDFF8}" type="datetimeFigureOut">
               <a:rPr lang="he-IL" smtClean="0"/>
-              <a:t>ב'/שבט/תשע"ז</a:t>
+              <a:t>ג'/שבט/תשע"ז</a:t>
             </a:fld>
             <a:endParaRPr lang="he-IL"/>
           </a:p>
@@ -18864,7 +21459,7 @@
           <a:p>
             <a:fld id="{2D53BDBD-A251-4BA0-ADCA-71664ACBDFF8}" type="datetimeFigureOut">
               <a:rPr lang="he-IL" smtClean="0"/>
-              <a:t>ב'/שבט/תשע"ז</a:t>
+              <a:t>ג'/שבט/תשע"ז</a:t>
             </a:fld>
             <a:endParaRPr lang="he-IL"/>
           </a:p>
@@ -19077,7 +21672,7 @@
           <a:p>
             <a:fld id="{2D53BDBD-A251-4BA0-ADCA-71664ACBDFF8}" type="datetimeFigureOut">
               <a:rPr lang="he-IL" smtClean="0"/>
-              <a:t>ב'/שבט/תשע"ז</a:t>
+              <a:t>ג'/שבט/תשע"ז</a:t>
             </a:fld>
             <a:endParaRPr lang="he-IL"/>
           </a:p>
@@ -26475,8 +29070,8 @@
           </a:fontRef>
         </p:style>
       </p:cxnSp>
-      <mc:AlternateContent xmlns:mc="http://schemas.openxmlformats.org/markup-compatibility/2006">
-        <mc:Choice xmlns:a14="http://schemas.microsoft.com/office/drawing/2010/main" Requires="a14">
+      <mc:AlternateContent xmlns:mc="http://schemas.openxmlformats.org/markup-compatibility/2006" xmlns:a14="http://schemas.microsoft.com/office/drawing/2010/main">
+        <mc:Choice Requires="a14">
           <p:sp>
             <p:nvSpPr>
               <p:cNvPr id="33" name="TextBox 32"/>
@@ -26586,7 +29181,7 @@
             </p:txBody>
           </p:sp>
         </mc:Choice>
-        <mc:Fallback>
+        <mc:Fallback xmlns="">
           <p:sp>
             <p:nvSpPr>
               <p:cNvPr id="33" name="TextBox 32"/>
@@ -26693,8 +29288,8 @@
           </a:fontRef>
         </p:style>
       </p:cxnSp>
-      <mc:AlternateContent xmlns:mc="http://schemas.openxmlformats.org/markup-compatibility/2006">
-        <mc:Choice xmlns:a14="http://schemas.microsoft.com/office/drawing/2010/main" Requires="a14">
+      <mc:AlternateContent xmlns:mc="http://schemas.openxmlformats.org/markup-compatibility/2006" xmlns:a14="http://schemas.microsoft.com/office/drawing/2010/main">
+        <mc:Choice Requires="a14">
           <p:sp>
             <p:nvSpPr>
               <p:cNvPr id="39" name="TextBox 38"/>
@@ -26806,7 +29401,7 @@
             </p:txBody>
           </p:sp>
         </mc:Choice>
-        <mc:Fallback>
+        <mc:Fallback xmlns="">
           <p:sp>
             <p:nvSpPr>
               <p:cNvPr id="39" name="TextBox 38"/>
@@ -26845,8 +29440,8 @@
           </p:sp>
         </mc:Fallback>
       </mc:AlternateContent>
-      <mc:AlternateContent xmlns:mc="http://schemas.openxmlformats.org/markup-compatibility/2006">
-        <mc:Choice xmlns:a14="http://schemas.microsoft.com/office/drawing/2010/main" Requires="a14">
+      <mc:AlternateContent xmlns:mc="http://schemas.openxmlformats.org/markup-compatibility/2006" xmlns:a14="http://schemas.microsoft.com/office/drawing/2010/main">
+        <mc:Choice Requires="a14">
           <p:sp>
             <p:nvSpPr>
               <p:cNvPr id="41" name="TextBox 40"/>
@@ -26956,7 +29551,7 @@
             </p:txBody>
           </p:sp>
         </mc:Choice>
-        <mc:Fallback>
+        <mc:Fallback xmlns="">
           <p:sp>
             <p:nvSpPr>
               <p:cNvPr id="41" name="TextBox 40"/>
@@ -26995,8 +29590,8 @@
           </p:sp>
         </mc:Fallback>
       </mc:AlternateContent>
-      <mc:AlternateContent xmlns:mc="http://schemas.openxmlformats.org/markup-compatibility/2006">
-        <mc:Choice xmlns:a14="http://schemas.microsoft.com/office/drawing/2010/main" Requires="a14">
+      <mc:AlternateContent xmlns:mc="http://schemas.openxmlformats.org/markup-compatibility/2006" xmlns:a14="http://schemas.microsoft.com/office/drawing/2010/main">
+        <mc:Choice Requires="a14">
           <p:sp>
             <p:nvSpPr>
               <p:cNvPr id="42" name="TextBox 41"/>
@@ -27121,7 +29716,7 @@
             </p:txBody>
           </p:sp>
         </mc:Choice>
-        <mc:Fallback>
+        <mc:Fallback xmlns="">
           <p:sp>
             <p:nvSpPr>
               <p:cNvPr id="42" name="TextBox 41"/>
@@ -32815,8 +35410,8 @@
           </p:sp>
         </mc:Fallback>
       </mc:AlternateContent>
-      <mc:AlternateContent xmlns:mc="http://schemas.openxmlformats.org/markup-compatibility/2006">
-        <mc:Choice xmlns:a14="http://schemas.microsoft.com/office/drawing/2010/main" Requires="a14">
+      <mc:AlternateContent xmlns:mc="http://schemas.openxmlformats.org/markup-compatibility/2006" xmlns:a14="http://schemas.microsoft.com/office/drawing/2010/main">
+        <mc:Choice Requires="a14">
           <p:sp>
             <p:nvSpPr>
               <p:cNvPr id="149" name="TextBox 148"/>
@@ -33266,7 +35861,7 @@
             </p:txBody>
           </p:sp>
         </mc:Choice>
-        <mc:Fallback>
+        <mc:Fallback xmlns="">
           <p:sp>
             <p:nvSpPr>
               <p:cNvPr id="149" name="TextBox 148"/>
@@ -33830,10 +36425,10 @@
           <a:p>
             <a:pPr algn="ctr"/>
             <a:r>
-              <a:rPr lang="en-US" dirty="0"/>
+              <a:rPr lang="en-US" sz="2000" b="1" dirty="0"/>
               <a:t>s</a:t>
             </a:r>
-            <a:endParaRPr lang="he-IL" baseline="-25000" dirty="0"/>
+            <a:endParaRPr lang="he-IL" sz="2000" b="1" baseline="-25000" dirty="0"/>
           </a:p>
         </p:txBody>
       </p:sp>
@@ -33973,8 +36568,8 @@
           </a:fontRef>
         </p:style>
       </p:cxnSp>
-      <mc:AlternateContent xmlns:mc="http://schemas.openxmlformats.org/markup-compatibility/2006">
-        <mc:Choice xmlns:a14="http://schemas.microsoft.com/office/drawing/2010/main" Requires="a14">
+      <mc:AlternateContent xmlns:mc="http://schemas.openxmlformats.org/markup-compatibility/2006" xmlns:a14="http://schemas.microsoft.com/office/drawing/2010/main">
+        <mc:Choice Requires="a14">
           <p:sp>
             <p:nvSpPr>
               <p:cNvPr id="35" name="TextBox 34"/>
@@ -34084,7 +36679,7 @@
             </p:txBody>
           </p:sp>
         </mc:Choice>
-        <mc:Fallback>
+        <mc:Fallback xmlns="">
           <p:sp>
             <p:nvSpPr>
               <p:cNvPr id="35" name="TextBox 34"/>
@@ -34191,8 +36786,8 @@
           </a:fontRef>
         </p:style>
       </p:cxnSp>
-      <mc:AlternateContent xmlns:mc="http://schemas.openxmlformats.org/markup-compatibility/2006">
-        <mc:Choice xmlns:a14="http://schemas.microsoft.com/office/drawing/2010/main" Requires="a14">
+      <mc:AlternateContent xmlns:mc="http://schemas.openxmlformats.org/markup-compatibility/2006" xmlns:a14="http://schemas.microsoft.com/office/drawing/2010/main">
+        <mc:Choice Requires="a14">
           <p:sp>
             <p:nvSpPr>
               <p:cNvPr id="38" name="TextBox 37"/>
@@ -34304,7 +36899,7 @@
             </p:txBody>
           </p:sp>
         </mc:Choice>
-        <mc:Fallback>
+        <mc:Fallback xmlns="">
           <p:sp>
             <p:nvSpPr>
               <p:cNvPr id="38" name="TextBox 37"/>
@@ -34343,8 +36938,8 @@
           </p:sp>
         </mc:Fallback>
       </mc:AlternateContent>
-      <mc:AlternateContent xmlns:mc="http://schemas.openxmlformats.org/markup-compatibility/2006">
-        <mc:Choice xmlns:a14="http://schemas.microsoft.com/office/drawing/2010/main" Requires="a14">
+      <mc:AlternateContent xmlns:mc="http://schemas.openxmlformats.org/markup-compatibility/2006" xmlns:a14="http://schemas.microsoft.com/office/drawing/2010/main">
+        <mc:Choice Requires="a14">
           <p:sp>
             <p:nvSpPr>
               <p:cNvPr id="39" name="TextBox 38"/>
@@ -34454,7 +37049,7 @@
             </p:txBody>
           </p:sp>
         </mc:Choice>
-        <mc:Fallback>
+        <mc:Fallback xmlns="">
           <p:sp>
             <p:nvSpPr>
               <p:cNvPr id="39" name="TextBox 38"/>
@@ -34591,7 +37186,7 @@
                         <a:rPr lang="en-US" sz="1600" b="0" i="1" smtClean="0">
                           <a:latin typeface="Cambria Math" panose="02040503050406030204" pitchFamily="18" charset="0"/>
                         </a:rPr>
-                        <m:t>5</m:t>
+                        <m:t>6</m:t>
                       </m:r>
                       <m:r>
                         <a:rPr lang="en-US" sz="1600" i="1">
@@ -35509,8 +38104,8 @@
           </a:p>
         </p:txBody>
       </p:sp>
-      <mc:AlternateContent xmlns:mc="http://schemas.openxmlformats.org/markup-compatibility/2006">
-        <mc:Choice xmlns:a14="http://schemas.microsoft.com/office/drawing/2010/main" Requires="a14">
+      <mc:AlternateContent xmlns:mc="http://schemas.openxmlformats.org/markup-compatibility/2006" xmlns:a14="http://schemas.microsoft.com/office/drawing/2010/main">
+        <mc:Choice Requires="a14">
           <p:sp>
             <p:nvSpPr>
               <p:cNvPr id="62" name="TextBox 61"/>
@@ -35966,7 +38561,7 @@
             </p:txBody>
           </p:sp>
         </mc:Choice>
-        <mc:Fallback>
+        <mc:Fallback xmlns="">
           <p:sp>
             <p:nvSpPr>
               <p:cNvPr id="62" name="TextBox 61"/>
@@ -36005,8 +38600,8 @@
           </p:sp>
         </mc:Fallback>
       </mc:AlternateContent>
-      <mc:AlternateContent xmlns:mc="http://schemas.openxmlformats.org/markup-compatibility/2006">
-        <mc:Choice xmlns:a14="http://schemas.microsoft.com/office/drawing/2010/main" Requires="a14">
+      <mc:AlternateContent xmlns:mc="http://schemas.openxmlformats.org/markup-compatibility/2006" xmlns:a14="http://schemas.microsoft.com/office/drawing/2010/main">
+        <mc:Choice Requires="a14">
           <p:sp>
             <p:nvSpPr>
               <p:cNvPr id="63" name="TextBox 62"/>
@@ -36456,7 +39051,7 @@
             </p:txBody>
           </p:sp>
         </mc:Choice>
-        <mc:Fallback>
+        <mc:Fallback xmlns="">
           <p:sp>
             <p:nvSpPr>
               <p:cNvPr id="63" name="TextBox 62"/>
@@ -39196,7 +41791,7 @@
           <p:nvPr>
             <p:extLst>
               <p:ext uri="{D42A27DB-BD31-4B8C-83A1-F6EECF244321}">
-                <p14:modId xmlns:p14="http://schemas.microsoft.com/office/powerpoint/2010/main" val="3168682405"/>
+                <p14:modId xmlns:p14="http://schemas.microsoft.com/office/powerpoint/2010/main" val="4137823297"/>
               </p:ext>
             </p:extLst>
           </p:nvPr>
@@ -39333,21 +41928,21 @@
       </p:pic>
       <p:graphicFrame>
         <p:nvGraphicFramePr>
-          <p:cNvPr id="13" name="Chart 12"/>
+          <p:cNvPr id="9" name="Chart 8"/>
           <p:cNvGraphicFramePr>
             <a:graphicFrameLocks/>
           </p:cNvGraphicFramePr>
           <p:nvPr>
             <p:extLst>
               <p:ext uri="{D42A27DB-BD31-4B8C-83A1-F6EECF244321}">
-                <p14:modId xmlns:p14="http://schemas.microsoft.com/office/powerpoint/2010/main" val="2786473576"/>
+                <p14:modId xmlns:p14="http://schemas.microsoft.com/office/powerpoint/2010/main" val="3335378459"/>
               </p:ext>
             </p:extLst>
           </p:nvPr>
         </p:nvGraphicFramePr>
         <p:xfrm>
-          <a:off x="0" y="1648692"/>
-          <a:ext cx="2416133" cy="2593685"/>
+          <a:off x="142700" y="1557055"/>
+          <a:ext cx="2153717" cy="2787345"/>
         </p:xfrm>
         <a:graphic>
           <a:graphicData uri="http://schemas.openxmlformats.org/drawingml/2006/chart">
@@ -39359,6 +41954,114 @@
     <p:extLst>
       <p:ext uri="{BB962C8B-B14F-4D97-AF65-F5344CB8AC3E}">
         <p14:creationId xmlns:p14="http://schemas.microsoft.com/office/powerpoint/2010/main" val="609302420"/>
+      </p:ext>
+    </p:extLst>
+  </p:cSld>
+  <p:clrMapOvr>
+    <a:masterClrMapping/>
+  </p:clrMapOvr>
+</p:sld>
+</file>
+
+<file path=ppt/slides/slide21.xml><?xml version="1.0" encoding="utf-8"?>
+<p:sld xmlns:a="http://schemas.openxmlformats.org/drawingml/2006/main" xmlns:r="http://schemas.openxmlformats.org/officeDocument/2006/relationships" xmlns:p="http://schemas.openxmlformats.org/presentationml/2006/main">
+  <p:cSld>
+    <p:spTree>
+      <p:nvGrpSpPr>
+        <p:cNvPr id="1" name=""/>
+        <p:cNvGrpSpPr/>
+        <p:nvPr/>
+      </p:nvGrpSpPr>
+      <p:grpSpPr>
+        <a:xfrm>
+          <a:off x="0" y="0"/>
+          <a:ext cx="0" cy="0"/>
+          <a:chOff x="0" y="0"/>
+          <a:chExt cx="0" cy="0"/>
+        </a:xfrm>
+      </p:grpSpPr>
+      <p:graphicFrame>
+        <p:nvGraphicFramePr>
+          <p:cNvPr id="4" name="Chart 3"/>
+          <p:cNvGraphicFramePr>
+            <a:graphicFrameLocks/>
+          </p:cNvGraphicFramePr>
+          <p:nvPr>
+            <p:extLst>
+              <p:ext uri="{D42A27DB-BD31-4B8C-83A1-F6EECF244321}">
+                <p14:modId xmlns:p14="http://schemas.microsoft.com/office/powerpoint/2010/main" val="3752276529"/>
+              </p:ext>
+            </p:extLst>
+          </p:nvPr>
+        </p:nvGraphicFramePr>
+        <p:xfrm>
+          <a:off x="3777138" y="1886902"/>
+          <a:ext cx="4637723" cy="3084195"/>
+        </p:xfrm>
+        <a:graphic>
+          <a:graphicData uri="http://schemas.openxmlformats.org/drawingml/2006/chart">
+            <c:chart xmlns:c="http://schemas.openxmlformats.org/drawingml/2006/chart" xmlns:r="http://schemas.openxmlformats.org/officeDocument/2006/relationships" r:id="rId2"/>
+          </a:graphicData>
+        </a:graphic>
+      </p:graphicFrame>
+    </p:spTree>
+    <p:extLst>
+      <p:ext uri="{BB962C8B-B14F-4D97-AF65-F5344CB8AC3E}">
+        <p14:creationId xmlns:p14="http://schemas.microsoft.com/office/powerpoint/2010/main" val="3276475563"/>
+      </p:ext>
+    </p:extLst>
+  </p:cSld>
+  <p:clrMapOvr>
+    <a:masterClrMapping/>
+  </p:clrMapOvr>
+</p:sld>
+</file>
+
+<file path=ppt/slides/slide22.xml><?xml version="1.0" encoding="utf-8"?>
+<p:sld xmlns:a="http://schemas.openxmlformats.org/drawingml/2006/main" xmlns:r="http://schemas.openxmlformats.org/officeDocument/2006/relationships" xmlns:p="http://schemas.openxmlformats.org/presentationml/2006/main">
+  <p:cSld>
+    <p:spTree>
+      <p:nvGrpSpPr>
+        <p:cNvPr id="1" name=""/>
+        <p:cNvGrpSpPr/>
+        <p:nvPr/>
+      </p:nvGrpSpPr>
+      <p:grpSpPr>
+        <a:xfrm>
+          <a:off x="0" y="0"/>
+          <a:ext cx="0" cy="0"/>
+          <a:chOff x="0" y="0"/>
+          <a:chExt cx="0" cy="0"/>
+        </a:xfrm>
+      </p:grpSpPr>
+      <p:graphicFrame>
+        <p:nvGraphicFramePr>
+          <p:cNvPr id="4" name="Chart 3"/>
+          <p:cNvGraphicFramePr>
+            <a:graphicFrameLocks/>
+          </p:cNvGraphicFramePr>
+          <p:nvPr>
+            <p:extLst>
+              <p:ext uri="{D42A27DB-BD31-4B8C-83A1-F6EECF244321}">
+                <p14:modId xmlns:p14="http://schemas.microsoft.com/office/powerpoint/2010/main" val="40282184"/>
+              </p:ext>
+            </p:extLst>
+          </p:nvPr>
+        </p:nvGraphicFramePr>
+        <p:xfrm>
+          <a:off x="4286250" y="2164080"/>
+          <a:ext cx="3619500" cy="2529840"/>
+        </p:xfrm>
+        <a:graphic>
+          <a:graphicData uri="http://schemas.openxmlformats.org/drawingml/2006/chart">
+            <c:chart xmlns:c="http://schemas.openxmlformats.org/drawingml/2006/chart" xmlns:r="http://schemas.openxmlformats.org/officeDocument/2006/relationships" r:id="rId2"/>
+          </a:graphicData>
+        </a:graphic>
+      </p:graphicFrame>
+    </p:spTree>
+    <p:extLst>
+      <p:ext uri="{BB962C8B-B14F-4D97-AF65-F5344CB8AC3E}">
+        <p14:creationId xmlns:p14="http://schemas.microsoft.com/office/powerpoint/2010/main" val="3989338915"/>
       </p:ext>
     </p:extLst>
   </p:cSld>

</xml_diff>